<commit_message>
[Presentation] Update to 23rd Nov Slides
Changes:
- First Draft for 23rd Nov 2016 class slides.

Signed-off-by: Chances-1 <brandonteohph@gmail.com>
</commit_message>
<xml_diff>
--- a/Java_Class_23rd_Nov.pptx
+++ b/Java_Class_23rd_Nov.pptx
@@ -5,14 +5,23 @@
     <p:sldMasterId id="2147483648" r:id="rId1"/>
   </p:sldMasterIdLst>
   <p:notesMasterIdLst>
-    <p:notesMasterId r:id="rId4"/>
+    <p:notesMasterId r:id="rId13"/>
   </p:notesMasterIdLst>
   <p:sldIdLst>
-    <p:sldId id="256" r:id="rId3"/>
-    <p:sldId id="257" r:id="rId5"/>
+    <p:sldId id="256" r:id="rId2"/>
+    <p:sldId id="257" r:id="rId3"/>
+    <p:sldId id="258" r:id="rId4"/>
+    <p:sldId id="259" r:id="rId5"/>
+    <p:sldId id="268" r:id="rId6"/>
+    <p:sldId id="272" r:id="rId7"/>
+    <p:sldId id="269" r:id="rId8"/>
+    <p:sldId id="260" r:id="rId9"/>
+    <p:sldId id="261" r:id="rId10"/>
+    <p:sldId id="270" r:id="rId11"/>
+    <p:sldId id="271" r:id="rId12"/>
   </p:sldIdLst>
   <p:sldSz cx="9144000" cy="6858000" type="screen4x3"/>
-  <p:notesSz cx="7103745" cy="10234295"/>
+  <p:notesSz cx="7104063" cy="10234613"/>
   <p:defaultTextStyle>
     <a:defPPr>
       <a:defRPr lang="en-US"/>
@@ -108,6 +117,14 @@
       </a:defRPr>
     </a:lvl9pPr>
   </p:defaultTextStyle>
+  <p:extLst>
+    <p:ext uri="{EFAFB233-063F-42B5-8137-9DF3F51BA10A}">
+      <p15:sldGuideLst xmlns:p15="http://schemas.microsoft.com/office/powerpoint/2012/main"/>
+    </p:ext>
+    <p:ext uri="{2D200454-40CA-4A62-9FC3-DE9A4176ACB9}">
+      <p15:notesGuideLst xmlns:p15="http://schemas.microsoft.com/office/powerpoint/2012/main"/>
+    </p:ext>
+  </p:extLst>
 </p:presentation>
 </file>
 
@@ -193,6 +210,7 @@
           <a:p>
             <a:fld id="{3EFD42F7-718C-4B98-AAEC-167E6DDD60A7}" type="datetimeFigureOut">
               <a:rPr lang="en-US" smtClean="0"/>
+              <a:t>11/21/2016</a:t>
             </a:fld>
             <a:endParaRPr lang="en-US"/>
           </a:p>
@@ -259,7 +277,6 @@
               <a:rPr lang="en-US" smtClean="0"/>
               <a:t>Click to edit Master text styles</a:t>
             </a:r>
-            <a:endParaRPr lang="en-US" smtClean="0"/>
           </a:p>
           <a:p>
             <a:pPr lvl="1"/>
@@ -267,7 +284,6 @@
               <a:rPr lang="en-US" smtClean="0"/>
               <a:t>Second level</a:t>
             </a:r>
-            <a:endParaRPr lang="en-US" smtClean="0"/>
           </a:p>
           <a:p>
             <a:pPr lvl="2"/>
@@ -275,7 +291,6 @@
               <a:rPr lang="en-US" smtClean="0"/>
               <a:t>Third level</a:t>
             </a:r>
-            <a:endParaRPr lang="en-US" smtClean="0"/>
           </a:p>
           <a:p>
             <a:pPr lvl="3"/>
@@ -283,7 +298,6 @@
               <a:rPr lang="en-US" smtClean="0"/>
               <a:t>Fourth level</a:t>
             </a:r>
-            <a:endParaRPr lang="en-US" smtClean="0"/>
           </a:p>
           <a:p>
             <a:pPr lvl="4"/>
@@ -355,12 +369,18 @@
           <a:p>
             <a:fld id="{21B2AA4F-B828-4D7C-AFD3-893933DAFCB4}" type="slidenum">
               <a:rPr lang="en-US" smtClean="0"/>
+              <a:t>‹#›</a:t>
             </a:fld>
             <a:endParaRPr lang="en-US"/>
           </a:p>
         </p:txBody>
       </p:sp>
     </p:spTree>
+    <p:extLst>
+      <p:ext uri="{BB962C8B-B14F-4D97-AF65-F5344CB8AC3E}">
+        <p14:creationId xmlns:p14="http://schemas.microsoft.com/office/powerpoint/2010/main" val="1370924345"/>
+      </p:ext>
+    </p:extLst>
   </p:cSld>
   <p:clrMap bg1="lt1" tx1="dk1" bg2="lt2" tx2="dk2" accent1="accent1" accent2="accent2" accent3="accent3" accent4="accent4" accent5="accent5" accent6="accent6" hlink="hlink" folHlink="folHlink"/>
   <p:notesStyle>
@@ -467,11 +487,20 @@
         <p:cNvGrpSpPr/>
         <p:nvPr/>
       </p:nvGrpSpPr>
-      <p:grpSpPr/>
+      <p:grpSpPr>
+        <a:xfrm>
+          <a:off x="0" y="0"/>
+          <a:ext cx="0" cy="0"/>
+          <a:chOff x="0" y="0"/>
+          <a:chExt cx="0" cy="0"/>
+        </a:xfrm>
+      </p:grpSpPr>
       <p:sp>
         <p:nvSpPr>
           <p:cNvPr id="2" name="Slide Image Placeholder 1"/>
-          <p:cNvSpPr/>
+          <p:cNvSpPr>
+            <a:spLocks noGrp="1" noRot="1" noChangeAspect="1"/>
+          </p:cNvSpPr>
           <p:nvPr>
             <p:ph type="sldImg" idx="2"/>
           </p:nvPr>
@@ -481,7 +510,9 @@
       <p:sp>
         <p:nvSpPr>
           <p:cNvPr id="3" name="Text Placeholder 2"/>
-          <p:cNvSpPr/>
+          <p:cNvSpPr>
+            <a:spLocks noGrp="1"/>
+          </p:cNvSpPr>
           <p:nvPr>
             <p:ph type="body" idx="3"/>
           </p:nvPr>
@@ -489,16 +520,21 @@
         <p:spPr/>
         <p:txBody>
           <a:bodyPr/>
+          <a:lstStyle/>
           <a:p>
             <a:r>
               <a:rPr lang="en-MY" altLang="en-US"/>
               <a:t>Title of class wot kim would have told me</a:t>
             </a:r>
-            <a:endParaRPr lang="en-MY" altLang="en-US"/>
           </a:p>
         </p:txBody>
       </p:sp>
     </p:spTree>
+    <p:extLst>
+      <p:ext uri="{BB962C8B-B14F-4D97-AF65-F5344CB8AC3E}">
+        <p14:creationId xmlns:p14="http://schemas.microsoft.com/office/powerpoint/2010/main" val="2972516159"/>
+      </p:ext>
+    </p:extLst>
   </p:cSld>
   <p:clrMapOvr>
     <a:masterClrMapping/>
@@ -515,38 +551,59 @@
         <p:cNvGrpSpPr/>
         <p:nvPr/>
       </p:nvGrpSpPr>
-      <p:grpSpPr/>
+      <p:grpSpPr>
+        <a:xfrm>
+          <a:off x="0" y="0"/>
+          <a:ext cx="0" cy="0"/>
+          <a:chOff x="0" y="0"/>
+          <a:chExt cx="0" cy="0"/>
+        </a:xfrm>
+      </p:grpSpPr>
       <p:sp>
         <p:nvSpPr>
           <p:cNvPr id="2" name="Slide Image Placeholder 1"/>
-          <p:cNvSpPr/>
+          <p:cNvSpPr>
+            <a:spLocks noGrp="1" noRot="1" noChangeAspect="1"/>
+          </p:cNvSpPr>
           <p:nvPr>
             <p:ph type="sldImg" idx="2"/>
           </p:nvPr>
         </p:nvSpPr>
+        <p:spPr>
+          <a:xfrm>
+            <a:off x="1249363" y="1279525"/>
+            <a:ext cx="4605337" cy="3454400"/>
+          </a:xfrm>
+        </p:spPr>
+      </p:sp>
+      <p:sp>
+        <p:nvSpPr>
+          <p:cNvPr id="3" name="Text Placeholder 2"/>
+          <p:cNvSpPr>
+            <a:spLocks noGrp="1"/>
+          </p:cNvSpPr>
+          <p:nvPr>
+            <p:ph type="body" idx="3"/>
+          </p:nvPr>
+        </p:nvSpPr>
         <p:spPr/>
-      </p:sp>
-      <p:sp>
-        <p:nvSpPr>
-          <p:cNvPr id="3" name="Text Placeholder 2"/>
-          <p:cNvSpPr/>
-          <p:nvPr>
-            <p:ph type="body" idx="3"/>
-          </p:nvPr>
-        </p:nvSpPr>
-        <p:spPr/>
         <p:txBody>
           <a:bodyPr/>
+          <a:lstStyle/>
           <a:p>
             <a:r>
               <a:rPr lang="en-MY" altLang="en-US"/>
               <a:t>Objects and Classes Slide</a:t>
             </a:r>
-            <a:endParaRPr lang="en-MY" altLang="en-US"/>
           </a:p>
         </p:txBody>
       </p:sp>
     </p:spTree>
+    <p:extLst>
+      <p:ext uri="{BB962C8B-B14F-4D97-AF65-F5344CB8AC3E}">
+        <p14:creationId xmlns:p14="http://schemas.microsoft.com/office/powerpoint/2010/main" val="2651714672"/>
+      </p:ext>
+    </p:extLst>
   </p:cSld>
   <p:clrMapOvr>
     <a:masterClrMapping/>
@@ -685,6 +742,7 @@
           <a:p>
             <a:fld id="{FDE934FF-F4E1-47C5-9CA5-30A81DDE2BE4}" type="datetimeFigureOut">
               <a:rPr lang="en-US" smtClean="0"/>
+              <a:t>11/21/2016</a:t>
             </a:fld>
             <a:endParaRPr lang="en-US"/>
           </a:p>
@@ -726,6 +784,7 @@
           <a:p>
             <a:fld id="{B3561BA9-CDCF-4958-B8AB-66F3BF063E13}" type="slidenum">
               <a:rPr lang="en-US" smtClean="0"/>
+              <a:t>‹#›</a:t>
             </a:fld>
             <a:endParaRPr lang="en-US"/>
           </a:p>
@@ -781,7 +840,6 @@
               <a:rPr lang="en-US" smtClean="0"/>
               <a:t>Click to edit Master text styles</a:t>
             </a:r>
-            <a:endParaRPr lang="en-US" smtClean="0"/>
           </a:p>
           <a:p>
             <a:pPr lvl="1"/>
@@ -789,7 +847,6 @@
               <a:rPr lang="en-US" smtClean="0"/>
               <a:t>Second level</a:t>
             </a:r>
-            <a:endParaRPr lang="en-US" smtClean="0"/>
           </a:p>
           <a:p>
             <a:pPr lvl="2"/>
@@ -797,7 +854,6 @@
               <a:rPr lang="en-US" smtClean="0"/>
               <a:t>Third level</a:t>
             </a:r>
-            <a:endParaRPr lang="en-US" smtClean="0"/>
           </a:p>
           <a:p>
             <a:pPr lvl="3"/>
@@ -805,7 +861,6 @@
               <a:rPr lang="en-US" smtClean="0"/>
               <a:t>Fourth level</a:t>
             </a:r>
-            <a:endParaRPr lang="en-US" smtClean="0"/>
           </a:p>
           <a:p>
             <a:pPr lvl="4"/>
@@ -834,6 +889,7 @@
           <a:p>
             <a:fld id="{FDE934FF-F4E1-47C5-9CA5-30A81DDE2BE4}" type="datetimeFigureOut">
               <a:rPr lang="en-US" smtClean="0"/>
+              <a:t>11/21/2016</a:t>
             </a:fld>
             <a:endParaRPr lang="en-US"/>
           </a:p>
@@ -875,6 +931,7 @@
           <a:p>
             <a:fld id="{B3561BA9-CDCF-4958-B8AB-66F3BF063E13}" type="slidenum">
               <a:rPr lang="en-US" smtClean="0"/>
+              <a:t>‹#›</a:t>
             </a:fld>
             <a:endParaRPr lang="en-US"/>
           </a:p>
@@ -948,7 +1005,6 @@
               <a:rPr lang="en-US" smtClean="0"/>
               <a:t>Click to edit Master text styles</a:t>
             </a:r>
-            <a:endParaRPr lang="en-US" smtClean="0"/>
           </a:p>
           <a:p>
             <a:pPr lvl="1"/>
@@ -956,7 +1012,6 @@
               <a:rPr lang="en-US" smtClean="0"/>
               <a:t>Second level</a:t>
             </a:r>
-            <a:endParaRPr lang="en-US" smtClean="0"/>
           </a:p>
           <a:p>
             <a:pPr lvl="2"/>
@@ -964,7 +1019,6 @@
               <a:rPr lang="en-US" smtClean="0"/>
               <a:t>Third level</a:t>
             </a:r>
-            <a:endParaRPr lang="en-US" smtClean="0"/>
           </a:p>
           <a:p>
             <a:pPr lvl="3"/>
@@ -972,7 +1026,6 @@
               <a:rPr lang="en-US" smtClean="0"/>
               <a:t>Fourth level</a:t>
             </a:r>
-            <a:endParaRPr lang="en-US" smtClean="0"/>
           </a:p>
           <a:p>
             <a:pPr lvl="4"/>
@@ -1001,6 +1054,7 @@
           <a:p>
             <a:fld id="{FDE934FF-F4E1-47C5-9CA5-30A81DDE2BE4}" type="datetimeFigureOut">
               <a:rPr lang="en-US" smtClean="0"/>
+              <a:t>11/21/2016</a:t>
             </a:fld>
             <a:endParaRPr lang="en-US"/>
           </a:p>
@@ -1042,6 +1096,7 @@
           <a:p>
             <a:fld id="{B3561BA9-CDCF-4958-B8AB-66F3BF063E13}" type="slidenum">
               <a:rPr lang="en-US" smtClean="0"/>
+              <a:t>‹#›</a:t>
             </a:fld>
             <a:endParaRPr lang="en-US"/>
           </a:p>
@@ -1220,7 +1275,6 @@
               <a:rPr lang="en-US" smtClean="0"/>
               <a:t>Click to edit Master text styles</a:t>
             </a:r>
-            <a:endParaRPr lang="en-US" smtClean="0"/>
           </a:p>
         </p:txBody>
       </p:sp>
@@ -1241,6 +1295,7 @@
           <a:p>
             <a:fld id="{FDE934FF-F4E1-47C5-9CA5-30A81DDE2BE4}" type="datetimeFigureOut">
               <a:rPr lang="en-US" smtClean="0"/>
+              <a:t>11/21/2016</a:t>
             </a:fld>
             <a:endParaRPr lang="en-US"/>
           </a:p>
@@ -1282,6 +1337,7 @@
           <a:p>
             <a:fld id="{B3561BA9-CDCF-4958-B8AB-66F3BF063E13}" type="slidenum">
               <a:rPr lang="en-US" smtClean="0"/>
+              <a:t>‹#›</a:t>
             </a:fld>
             <a:endParaRPr lang="en-US"/>
           </a:p>
@@ -1360,7 +1416,6 @@
               <a:rPr lang="en-US" smtClean="0"/>
               <a:t>Click to edit Master text styles</a:t>
             </a:r>
-            <a:endParaRPr lang="en-US" smtClean="0"/>
           </a:p>
           <a:p>
             <a:pPr lvl="1"/>
@@ -1368,7 +1423,6 @@
               <a:rPr lang="en-US" smtClean="0"/>
               <a:t>Second level</a:t>
             </a:r>
-            <a:endParaRPr lang="en-US" smtClean="0"/>
           </a:p>
           <a:p>
             <a:pPr lvl="2"/>
@@ -1376,7 +1430,6 @@
               <a:rPr lang="en-US" smtClean="0"/>
               <a:t>Third level</a:t>
             </a:r>
-            <a:endParaRPr lang="en-US" smtClean="0"/>
           </a:p>
           <a:p>
             <a:pPr lvl="3"/>
@@ -1384,7 +1437,6 @@
               <a:rPr lang="en-US" smtClean="0"/>
               <a:t>Fourth level</a:t>
             </a:r>
-            <a:endParaRPr lang="en-US" smtClean="0"/>
           </a:p>
           <a:p>
             <a:pPr lvl="4"/>
@@ -1421,7 +1473,6 @@
               <a:rPr lang="en-US" smtClean="0"/>
               <a:t>Click to edit Master text styles</a:t>
             </a:r>
-            <a:endParaRPr lang="en-US" smtClean="0"/>
           </a:p>
           <a:p>
             <a:pPr lvl="1"/>
@@ -1429,7 +1480,6 @@
               <a:rPr lang="en-US" smtClean="0"/>
               <a:t>Second level</a:t>
             </a:r>
-            <a:endParaRPr lang="en-US" smtClean="0"/>
           </a:p>
           <a:p>
             <a:pPr lvl="2"/>
@@ -1437,7 +1487,6 @@
               <a:rPr lang="en-US" smtClean="0"/>
               <a:t>Third level</a:t>
             </a:r>
-            <a:endParaRPr lang="en-US" smtClean="0"/>
           </a:p>
           <a:p>
             <a:pPr lvl="3"/>
@@ -1445,7 +1494,6 @@
               <a:rPr lang="en-US" smtClean="0"/>
               <a:t>Fourth level</a:t>
             </a:r>
-            <a:endParaRPr lang="en-US" smtClean="0"/>
           </a:p>
           <a:p>
             <a:pPr lvl="4"/>
@@ -1474,6 +1522,7 @@
           <a:p>
             <a:fld id="{FDE934FF-F4E1-47C5-9CA5-30A81DDE2BE4}" type="datetimeFigureOut">
               <a:rPr lang="en-US" smtClean="0"/>
+              <a:t>11/21/2016</a:t>
             </a:fld>
             <a:endParaRPr lang="en-US"/>
           </a:p>
@@ -1515,6 +1564,7 @@
           <a:p>
             <a:fld id="{B3561BA9-CDCF-4958-B8AB-66F3BF063E13}" type="slidenum">
               <a:rPr lang="en-US" smtClean="0"/>
+              <a:t>‹#›</a:t>
             </a:fld>
             <a:endParaRPr lang="en-US"/>
           </a:p>
@@ -1635,7 +1685,6 @@
               <a:rPr lang="en-US" smtClean="0"/>
               <a:t>Click to edit Master text styles</a:t>
             </a:r>
-            <a:endParaRPr lang="en-US" smtClean="0"/>
           </a:p>
         </p:txBody>
       </p:sp>
@@ -1664,7 +1713,6 @@
               <a:rPr lang="en-US" smtClean="0"/>
               <a:t>Click to edit Master text styles</a:t>
             </a:r>
-            <a:endParaRPr lang="en-US" smtClean="0"/>
           </a:p>
           <a:p>
             <a:pPr lvl="1"/>
@@ -1672,7 +1720,6 @@
               <a:rPr lang="en-US" smtClean="0"/>
               <a:t>Second level</a:t>
             </a:r>
-            <a:endParaRPr lang="en-US" smtClean="0"/>
           </a:p>
           <a:p>
             <a:pPr lvl="2"/>
@@ -1680,7 +1727,6 @@
               <a:rPr lang="en-US" smtClean="0"/>
               <a:t>Third level</a:t>
             </a:r>
-            <a:endParaRPr lang="en-US" smtClean="0"/>
           </a:p>
           <a:p>
             <a:pPr lvl="3"/>
@@ -1688,7 +1734,6 @@
               <a:rPr lang="en-US" smtClean="0"/>
               <a:t>Fourth level</a:t>
             </a:r>
-            <a:endParaRPr lang="en-US" smtClean="0"/>
           </a:p>
           <a:p>
             <a:pPr lvl="4"/>
@@ -1762,7 +1807,6 @@
               <a:rPr lang="en-US" smtClean="0"/>
               <a:t>Click to edit Master text styles</a:t>
             </a:r>
-            <a:endParaRPr lang="en-US" smtClean="0"/>
           </a:p>
         </p:txBody>
       </p:sp>
@@ -1791,7 +1835,6 @@
               <a:rPr lang="en-US" smtClean="0"/>
               <a:t>Click to edit Master text styles</a:t>
             </a:r>
-            <a:endParaRPr lang="en-US" smtClean="0"/>
           </a:p>
           <a:p>
             <a:pPr lvl="1"/>
@@ -1799,7 +1842,6 @@
               <a:rPr lang="en-US" smtClean="0"/>
               <a:t>Second level</a:t>
             </a:r>
-            <a:endParaRPr lang="en-US" smtClean="0"/>
           </a:p>
           <a:p>
             <a:pPr lvl="2"/>
@@ -1807,7 +1849,6 @@
               <a:rPr lang="en-US" smtClean="0"/>
               <a:t>Third level</a:t>
             </a:r>
-            <a:endParaRPr lang="en-US" smtClean="0"/>
           </a:p>
           <a:p>
             <a:pPr lvl="3"/>
@@ -1815,7 +1856,6 @@
               <a:rPr lang="en-US" smtClean="0"/>
               <a:t>Fourth level</a:t>
             </a:r>
-            <a:endParaRPr lang="en-US" smtClean="0"/>
           </a:p>
           <a:p>
             <a:pPr lvl="4"/>
@@ -1844,6 +1884,7 @@
           <a:p>
             <a:fld id="{FDE934FF-F4E1-47C5-9CA5-30A81DDE2BE4}" type="datetimeFigureOut">
               <a:rPr lang="en-US" smtClean="0"/>
+              <a:t>11/21/2016</a:t>
             </a:fld>
             <a:endParaRPr lang="en-US"/>
           </a:p>
@@ -1885,6 +1926,7 @@
           <a:p>
             <a:fld id="{B3561BA9-CDCF-4958-B8AB-66F3BF063E13}" type="slidenum">
               <a:rPr lang="en-US" smtClean="0"/>
+              <a:t>‹#›</a:t>
             </a:fld>
             <a:endParaRPr lang="en-US"/>
           </a:p>
@@ -1955,6 +1997,7 @@
           <a:p>
             <a:fld id="{FDE934FF-F4E1-47C5-9CA5-30A81DDE2BE4}" type="datetimeFigureOut">
               <a:rPr lang="en-US" smtClean="0"/>
+              <a:t>11/21/2016</a:t>
             </a:fld>
             <a:endParaRPr lang="en-US"/>
           </a:p>
@@ -1996,6 +2039,7 @@
           <a:p>
             <a:fld id="{B3561BA9-CDCF-4958-B8AB-66F3BF063E13}" type="slidenum">
               <a:rPr lang="en-US" smtClean="0"/>
+              <a:t>‹#›</a:t>
             </a:fld>
             <a:endParaRPr lang="en-US"/>
           </a:p>
@@ -2043,6 +2087,7 @@
           <a:p>
             <a:fld id="{FDE934FF-F4E1-47C5-9CA5-30A81DDE2BE4}" type="datetimeFigureOut">
               <a:rPr lang="en-US" smtClean="0"/>
+              <a:t>11/21/2016</a:t>
             </a:fld>
             <a:endParaRPr lang="en-US"/>
           </a:p>
@@ -2084,6 +2129,7 @@
           <a:p>
             <a:fld id="{B3561BA9-CDCF-4958-B8AB-66F3BF063E13}" type="slidenum">
               <a:rPr lang="en-US" smtClean="0"/>
+              <a:t>‹#›</a:t>
             </a:fld>
             <a:endParaRPr lang="en-US"/>
           </a:p>
@@ -2269,7 +2315,6 @@
               <a:rPr lang="en-US" smtClean="0"/>
               <a:t>Click to edit Master text styles</a:t>
             </a:r>
-            <a:endParaRPr lang="en-US" smtClean="0"/>
           </a:p>
         </p:txBody>
       </p:sp>
@@ -2290,6 +2335,7 @@
           <a:p>
             <a:fld id="{FDE934FF-F4E1-47C5-9CA5-30A81DDE2BE4}" type="datetimeFigureOut">
               <a:rPr lang="en-US" smtClean="0"/>
+              <a:t>11/21/2016</a:t>
             </a:fld>
             <a:endParaRPr lang="en-US"/>
           </a:p>
@@ -2331,6 +2377,7 @@
           <a:p>
             <a:fld id="{B3561BA9-CDCF-4958-B8AB-66F3BF063E13}" type="slidenum">
               <a:rPr lang="en-US" smtClean="0"/>
+              <a:t>‹#›</a:t>
             </a:fld>
             <a:endParaRPr lang="en-US"/>
           </a:p>
@@ -2421,7 +2468,6 @@
               <a:rPr lang="en-US" smtClean="0"/>
               <a:t>Click to edit Master text styles</a:t>
             </a:r>
-            <a:endParaRPr lang="en-US" smtClean="0"/>
           </a:p>
           <a:p>
             <a:pPr lvl="1"/>
@@ -2429,7 +2475,6 @@
               <a:rPr lang="en-US" smtClean="0"/>
               <a:t>Second level</a:t>
             </a:r>
-            <a:endParaRPr lang="en-US" smtClean="0"/>
           </a:p>
           <a:p>
             <a:pPr lvl="2"/>
@@ -2437,7 +2482,6 @@
               <a:rPr lang="en-US" smtClean="0"/>
               <a:t>Third level</a:t>
             </a:r>
-            <a:endParaRPr lang="en-US" smtClean="0"/>
           </a:p>
           <a:p>
             <a:pPr lvl="3"/>
@@ -2445,7 +2489,6 @@
               <a:rPr lang="en-US" smtClean="0"/>
               <a:t>Fourth level</a:t>
             </a:r>
-            <a:endParaRPr lang="en-US" smtClean="0"/>
           </a:p>
           <a:p>
             <a:pPr lvl="4"/>
@@ -2474,6 +2517,7 @@
           <a:p>
             <a:fld id="{FDE934FF-F4E1-47C5-9CA5-30A81DDE2BE4}" type="datetimeFigureOut">
               <a:rPr lang="en-US" smtClean="0"/>
+              <a:t>11/21/2016</a:t>
             </a:fld>
             <a:endParaRPr lang="en-US"/>
           </a:p>
@@ -2515,6 +2559,7 @@
           <a:p>
             <a:fld id="{B3561BA9-CDCF-4958-B8AB-66F3BF063E13}" type="slidenum">
               <a:rPr lang="en-US" smtClean="0"/>
+              <a:t>‹#›</a:t>
             </a:fld>
             <a:endParaRPr lang="en-US"/>
           </a:p>
@@ -2613,7 +2658,6 @@
               <a:rPr lang="en-US" smtClean="0"/>
               <a:t>Click to edit Master text styles</a:t>
             </a:r>
-            <a:endParaRPr lang="en-US" smtClean="0"/>
           </a:p>
           <a:p>
             <a:pPr lvl="1"/>
@@ -2621,7 +2665,6 @@
               <a:rPr lang="en-US" smtClean="0"/>
               <a:t>Second level</a:t>
             </a:r>
-            <a:endParaRPr lang="en-US" smtClean="0"/>
           </a:p>
           <a:p>
             <a:pPr lvl="2"/>
@@ -2629,7 +2672,6 @@
               <a:rPr lang="en-US" smtClean="0"/>
               <a:t>Third level</a:t>
             </a:r>
-            <a:endParaRPr lang="en-US" smtClean="0"/>
           </a:p>
           <a:p>
             <a:pPr lvl="3"/>
@@ -2637,7 +2679,6 @@
               <a:rPr lang="en-US" smtClean="0"/>
               <a:t>Fourth level</a:t>
             </a:r>
-            <a:endParaRPr lang="en-US" smtClean="0"/>
           </a:p>
           <a:p>
             <a:pPr lvl="4"/>
@@ -2684,6 +2725,7 @@
           <a:p>
             <a:fld id="{FDE934FF-F4E1-47C5-9CA5-30A81DDE2BE4}" type="datetimeFigureOut">
               <a:rPr lang="en-US" smtClean="0"/>
+              <a:t>11/21/2016</a:t>
             </a:fld>
             <a:endParaRPr lang="en-US"/>
           </a:p>
@@ -2761,6 +2803,7 @@
           <a:p>
             <a:fld id="{B3561BA9-CDCF-4958-B8AB-66F3BF063E13}" type="slidenum">
               <a:rPr lang="en-US" smtClean="0"/>
+              <a:t>‹#›</a:t>
             </a:fld>
             <a:endParaRPr lang="en-US"/>
           </a:p>
@@ -3073,7 +3116,14 @@
         <p:cNvGrpSpPr/>
         <p:nvPr/>
       </p:nvGrpSpPr>
-      <p:grpSpPr/>
+      <p:grpSpPr>
+        <a:xfrm>
+          <a:off x="0" y="0"/>
+          <a:ext cx="0" cy="0"/>
+          <a:chOff x="0" y="0"/>
+          <a:chExt cx="0" cy="0"/>
+        </a:xfrm>
+      </p:grpSpPr>
       <p:sp>
         <p:nvSpPr>
           <p:cNvPr id="4" name="Text Box 3"/>
@@ -3094,16 +3144,562 @@
           <a:bodyPr wrap="none" rtlCol="0">
             <a:spAutoFit/>
           </a:bodyPr>
+          <a:lstStyle/>
           <a:p>
             <a:r>
               <a:rPr lang="en-MY" altLang="en-US" sz="6000"/>
               <a:t>Hello.</a:t>
             </a:r>
-            <a:endParaRPr lang="en-MY" altLang="en-US" sz="6000"/>
           </a:p>
         </p:txBody>
       </p:sp>
     </p:spTree>
+  </p:cSld>
+  <p:clrMapOvr>
+    <a:masterClrMapping/>
+  </p:clrMapOvr>
+</p:sld>
+</file>
+
+<file path=ppt/slides/slide10.xml><?xml version="1.0" encoding="utf-8"?>
+<p:sld xmlns:a="http://schemas.openxmlformats.org/drawingml/2006/main" xmlns:r="http://schemas.openxmlformats.org/officeDocument/2006/relationships" xmlns:p="http://schemas.openxmlformats.org/presentationml/2006/main">
+  <p:cSld>
+    <p:spTree>
+      <p:nvGrpSpPr>
+        <p:cNvPr id="1" name=""/>
+        <p:cNvGrpSpPr/>
+        <p:nvPr/>
+      </p:nvGrpSpPr>
+      <p:grpSpPr>
+        <a:xfrm>
+          <a:off x="0" y="0"/>
+          <a:ext cx="0" cy="0"/>
+          <a:chOff x="0" y="0"/>
+          <a:chExt cx="0" cy="0"/>
+        </a:xfrm>
+      </p:grpSpPr>
+      <p:sp>
+        <p:nvSpPr>
+          <p:cNvPr id="5" name="Text Box 3"/>
+          <p:cNvSpPr txBox="1"/>
+          <p:nvPr/>
+        </p:nvSpPr>
+        <p:spPr>
+          <a:xfrm>
+            <a:off x="236306" y="359461"/>
+            <a:ext cx="2979506" cy="769441"/>
+          </a:xfrm>
+          <a:prstGeom prst="rect">
+            <a:avLst/>
+          </a:prstGeom>
+          <a:noFill/>
+        </p:spPr>
+        <p:txBody>
+          <a:bodyPr wrap="square" rtlCol="0">
+            <a:spAutoFit/>
+          </a:bodyPr>
+          <a:lstStyle/>
+          <a:p>
+            <a:pPr algn="ctr"/>
+            <a:r>
+              <a:rPr lang="en-US" altLang="en-US" sz="4400" dirty="0" smtClean="0"/>
+              <a:t>Overriding</a:t>
+            </a:r>
+          </a:p>
+        </p:txBody>
+      </p:sp>
+      <p:sp>
+        <p:nvSpPr>
+          <p:cNvPr id="6" name="TextBox 5"/>
+          <p:cNvSpPr txBox="1"/>
+          <p:nvPr/>
+        </p:nvSpPr>
+        <p:spPr>
+          <a:xfrm>
+            <a:off x="1160980" y="1325366"/>
+            <a:ext cx="6462445" cy="1077218"/>
+          </a:xfrm>
+          <a:prstGeom prst="rect">
+            <a:avLst/>
+          </a:prstGeom>
+          <a:noFill/>
+        </p:spPr>
+        <p:txBody>
+          <a:bodyPr wrap="square" rtlCol="0">
+            <a:spAutoFit/>
+          </a:bodyPr>
+          <a:lstStyle/>
+          <a:p>
+            <a:r>
+              <a:rPr lang="en-US" sz="3200" dirty="0" smtClean="0"/>
+              <a:t>A quick prelude into what we will be doing next time…</a:t>
+            </a:r>
+            <a:endParaRPr lang="en-MY" sz="3200" dirty="0"/>
+          </a:p>
+        </p:txBody>
+      </p:sp>
+      <p:sp>
+        <p:nvSpPr>
+          <p:cNvPr id="7" name="TextBox 6"/>
+          <p:cNvSpPr txBox="1"/>
+          <p:nvPr/>
+        </p:nvSpPr>
+        <p:spPr>
+          <a:xfrm>
+            <a:off x="1607905" y="2446647"/>
+            <a:ext cx="5568594" cy="830997"/>
+          </a:xfrm>
+          <a:prstGeom prst="rect">
+            <a:avLst/>
+          </a:prstGeom>
+          <a:noFill/>
+        </p:spPr>
+        <p:txBody>
+          <a:bodyPr wrap="square" rtlCol="0">
+            <a:spAutoFit/>
+          </a:bodyPr>
+          <a:lstStyle/>
+          <a:p>
+            <a:pPr marL="285750" indent="-285750">
+              <a:buFontTx/>
+              <a:buChar char="-"/>
+            </a:pPr>
+            <a:r>
+              <a:rPr lang="en-US" sz="2400" dirty="0" smtClean="0"/>
+              <a:t>Overriding is when you think you have a better idea of what a method should do.</a:t>
+            </a:r>
+          </a:p>
+        </p:txBody>
+      </p:sp>
+      <p:pic>
+        <p:nvPicPr>
+          <p:cNvPr id="8" name="Picture 7"/>
+          <p:cNvPicPr>
+            <a:picLocks noChangeAspect="1"/>
+          </p:cNvPicPr>
+          <p:nvPr/>
+        </p:nvPicPr>
+        <p:blipFill>
+          <a:blip r:embed="rId2">
+            <a:extLst>
+              <a:ext uri="{28A0092B-C50C-407E-A947-70E740481C1C}">
+                <a14:useLocalDpi xmlns:a14="http://schemas.microsoft.com/office/drawing/2010/main" val="0"/>
+              </a:ext>
+            </a:extLst>
+          </a:blip>
+          <a:stretch>
+            <a:fillRect/>
+          </a:stretch>
+        </p:blipFill>
+        <p:spPr>
+          <a:xfrm>
+            <a:off x="3021126" y="5244736"/>
+            <a:ext cx="2545756" cy="993124"/>
+          </a:xfrm>
+          <a:prstGeom prst="rect">
+            <a:avLst/>
+          </a:prstGeom>
+        </p:spPr>
+      </p:pic>
+      <p:pic>
+        <p:nvPicPr>
+          <p:cNvPr id="9" name="Picture 8"/>
+          <p:cNvPicPr>
+            <a:picLocks noChangeAspect="1"/>
+          </p:cNvPicPr>
+          <p:nvPr/>
+        </p:nvPicPr>
+        <p:blipFill>
+          <a:blip r:embed="rId3">
+            <a:extLst>
+              <a:ext uri="{28A0092B-C50C-407E-A947-70E740481C1C}">
+                <a14:useLocalDpi xmlns:a14="http://schemas.microsoft.com/office/drawing/2010/main" val="0"/>
+              </a:ext>
+            </a:extLst>
+          </a:blip>
+          <a:stretch>
+            <a:fillRect/>
+          </a:stretch>
+        </p:blipFill>
+        <p:spPr>
+          <a:xfrm>
+            <a:off x="860936" y="3623424"/>
+            <a:ext cx="3433068" cy="767238"/>
+          </a:xfrm>
+          <a:prstGeom prst="rect">
+            <a:avLst/>
+          </a:prstGeom>
+        </p:spPr>
+      </p:pic>
+      <p:pic>
+        <p:nvPicPr>
+          <p:cNvPr id="10" name="Picture 9"/>
+          <p:cNvPicPr>
+            <a:picLocks noChangeAspect="1"/>
+          </p:cNvPicPr>
+          <p:nvPr/>
+        </p:nvPicPr>
+        <p:blipFill>
+          <a:blip r:embed="rId4">
+            <a:extLst>
+              <a:ext uri="{28A0092B-C50C-407E-A947-70E740481C1C}">
+                <a14:useLocalDpi xmlns:a14="http://schemas.microsoft.com/office/drawing/2010/main" val="0"/>
+              </a:ext>
+            </a:extLst>
+          </a:blip>
+          <a:stretch>
+            <a:fillRect/>
+          </a:stretch>
+        </p:blipFill>
+        <p:spPr>
+          <a:xfrm>
+            <a:off x="6013440" y="3804926"/>
+            <a:ext cx="1966520" cy="322102"/>
+          </a:xfrm>
+          <a:prstGeom prst="rect">
+            <a:avLst/>
+          </a:prstGeom>
+        </p:spPr>
+      </p:pic>
+      <p:pic>
+        <p:nvPicPr>
+          <p:cNvPr id="11" name="Picture 10"/>
+          <p:cNvPicPr>
+            <a:picLocks noChangeAspect="1"/>
+          </p:cNvPicPr>
+          <p:nvPr/>
+        </p:nvPicPr>
+        <p:blipFill>
+          <a:blip r:embed="rId5">
+            <a:extLst>
+              <a:ext uri="{28A0092B-C50C-407E-A947-70E740481C1C}">
+                <a14:useLocalDpi xmlns:a14="http://schemas.microsoft.com/office/drawing/2010/main" val="0"/>
+              </a:ext>
+            </a:extLst>
+          </a:blip>
+          <a:stretch>
+            <a:fillRect/>
+          </a:stretch>
+        </p:blipFill>
+        <p:spPr>
+          <a:xfrm>
+            <a:off x="6762605" y="5543780"/>
+            <a:ext cx="468191" cy="395036"/>
+          </a:xfrm>
+          <a:prstGeom prst="rect">
+            <a:avLst/>
+          </a:prstGeom>
+        </p:spPr>
+      </p:pic>
+      <p:cxnSp>
+        <p:nvCxnSpPr>
+          <p:cNvPr id="13" name="Straight Arrow Connector 12"/>
+          <p:cNvCxnSpPr/>
+          <p:nvPr/>
+        </p:nvCxnSpPr>
+        <p:spPr>
+          <a:xfrm>
+            <a:off x="4756935" y="3965977"/>
+            <a:ext cx="996593" cy="0"/>
+          </a:xfrm>
+          <a:prstGeom prst="straightConnector1">
+            <a:avLst/>
+          </a:prstGeom>
+          <a:ln>
+            <a:tailEnd type="triangle"/>
+          </a:ln>
+        </p:spPr>
+        <p:style>
+          <a:lnRef idx="3">
+            <a:schemeClr val="dk1"/>
+          </a:lnRef>
+          <a:fillRef idx="0">
+            <a:schemeClr val="dk1"/>
+          </a:fillRef>
+          <a:effectRef idx="2">
+            <a:schemeClr val="dk1"/>
+          </a:effectRef>
+          <a:fontRef idx="minor">
+            <a:schemeClr val="tx1"/>
+          </a:fontRef>
+        </p:style>
+      </p:cxnSp>
+      <p:cxnSp>
+        <p:nvCxnSpPr>
+          <p:cNvPr id="15" name="Straight Arrow Connector 14"/>
+          <p:cNvCxnSpPr/>
+          <p:nvPr/>
+        </p:nvCxnSpPr>
+        <p:spPr>
+          <a:xfrm>
+            <a:off x="2032847" y="4548187"/>
+            <a:ext cx="780836" cy="1058239"/>
+          </a:xfrm>
+          <a:prstGeom prst="straightConnector1">
+            <a:avLst/>
+          </a:prstGeom>
+          <a:ln>
+            <a:tailEnd type="triangle"/>
+          </a:ln>
+        </p:spPr>
+        <p:style>
+          <a:lnRef idx="3">
+            <a:schemeClr val="dk1"/>
+          </a:lnRef>
+          <a:fillRef idx="0">
+            <a:schemeClr val="dk1"/>
+          </a:fillRef>
+          <a:effectRef idx="2">
+            <a:schemeClr val="dk1"/>
+          </a:effectRef>
+          <a:fontRef idx="minor">
+            <a:schemeClr val="tx1"/>
+          </a:fontRef>
+        </p:style>
+      </p:cxnSp>
+      <p:cxnSp>
+        <p:nvCxnSpPr>
+          <p:cNvPr id="17" name="Straight Arrow Connector 16"/>
+          <p:cNvCxnSpPr/>
+          <p:nvPr/>
+        </p:nvCxnSpPr>
+        <p:spPr>
+          <a:xfrm>
+            <a:off x="5876818" y="5606426"/>
+            <a:ext cx="585627" cy="0"/>
+          </a:xfrm>
+          <a:prstGeom prst="straightConnector1">
+            <a:avLst/>
+          </a:prstGeom>
+          <a:ln>
+            <a:tailEnd type="triangle"/>
+          </a:ln>
+        </p:spPr>
+        <p:style>
+          <a:lnRef idx="3">
+            <a:schemeClr val="dk1"/>
+          </a:lnRef>
+          <a:fillRef idx="0">
+            <a:schemeClr val="dk1"/>
+          </a:fillRef>
+          <a:effectRef idx="2">
+            <a:schemeClr val="dk1"/>
+          </a:effectRef>
+          <a:fontRef idx="minor">
+            <a:schemeClr val="tx1"/>
+          </a:fontRef>
+        </p:style>
+      </p:cxnSp>
+      <p:sp>
+        <p:nvSpPr>
+          <p:cNvPr id="18" name="TextBox 17"/>
+          <p:cNvSpPr txBox="1"/>
+          <p:nvPr/>
+        </p:nvSpPr>
+        <p:spPr>
+          <a:xfrm>
+            <a:off x="4392202" y="3435594"/>
+            <a:ext cx="1803635" cy="369332"/>
+          </a:xfrm>
+          <a:prstGeom prst="rect">
+            <a:avLst/>
+          </a:prstGeom>
+          <a:noFill/>
+        </p:spPr>
+        <p:txBody>
+          <a:bodyPr wrap="none" rtlCol="0">
+            <a:spAutoFit/>
+          </a:bodyPr>
+          <a:lstStyle/>
+          <a:p>
+            <a:r>
+              <a:rPr lang="en-US" dirty="0" smtClean="0"/>
+              <a:t>Without override</a:t>
+            </a:r>
+          </a:p>
+        </p:txBody>
+      </p:sp>
+      <p:sp>
+        <p:nvSpPr>
+          <p:cNvPr id="19" name="TextBox 18"/>
+          <p:cNvSpPr txBox="1"/>
+          <p:nvPr/>
+        </p:nvSpPr>
+        <p:spPr>
+          <a:xfrm>
+            <a:off x="981393" y="5082222"/>
+            <a:ext cx="1483035" cy="369332"/>
+          </a:xfrm>
+          <a:prstGeom prst="rect">
+            <a:avLst/>
+          </a:prstGeom>
+          <a:noFill/>
+        </p:spPr>
+        <p:txBody>
+          <a:bodyPr wrap="none" rtlCol="0">
+            <a:spAutoFit/>
+          </a:bodyPr>
+          <a:lstStyle/>
+          <a:p>
+            <a:r>
+              <a:rPr lang="en-US" dirty="0" smtClean="0"/>
+              <a:t>With override</a:t>
+            </a:r>
+            <a:endParaRPr lang="en-MY" dirty="0"/>
+          </a:p>
+        </p:txBody>
+      </p:sp>
+    </p:spTree>
+    <p:extLst>
+      <p:ext uri="{BB962C8B-B14F-4D97-AF65-F5344CB8AC3E}">
+        <p14:creationId xmlns:p14="http://schemas.microsoft.com/office/powerpoint/2010/main" val="1802514469"/>
+      </p:ext>
+    </p:extLst>
+  </p:cSld>
+  <p:clrMapOvr>
+    <a:masterClrMapping/>
+  </p:clrMapOvr>
+</p:sld>
+</file>
+
+<file path=ppt/slides/slide11.xml><?xml version="1.0" encoding="utf-8"?>
+<p:sld xmlns:a="http://schemas.openxmlformats.org/drawingml/2006/main" xmlns:r="http://schemas.openxmlformats.org/officeDocument/2006/relationships" xmlns:p="http://schemas.openxmlformats.org/presentationml/2006/main">
+  <p:cSld>
+    <p:spTree>
+      <p:nvGrpSpPr>
+        <p:cNvPr id="1" name=""/>
+        <p:cNvGrpSpPr/>
+        <p:nvPr/>
+      </p:nvGrpSpPr>
+      <p:grpSpPr>
+        <a:xfrm>
+          <a:off x="0" y="0"/>
+          <a:ext cx="0" cy="0"/>
+          <a:chOff x="0" y="0"/>
+          <a:chExt cx="0" cy="0"/>
+        </a:xfrm>
+      </p:grpSpPr>
+      <p:sp>
+        <p:nvSpPr>
+          <p:cNvPr id="4" name="TextBox 3"/>
+          <p:cNvSpPr txBox="1"/>
+          <p:nvPr/>
+        </p:nvSpPr>
+        <p:spPr>
+          <a:xfrm>
+            <a:off x="1202077" y="1828800"/>
+            <a:ext cx="6965878" cy="4031873"/>
+          </a:xfrm>
+          <a:prstGeom prst="rect">
+            <a:avLst/>
+          </a:prstGeom>
+          <a:noFill/>
+        </p:spPr>
+        <p:txBody>
+          <a:bodyPr wrap="square" rtlCol="0">
+            <a:spAutoFit/>
+          </a:bodyPr>
+          <a:lstStyle/>
+          <a:p>
+            <a:endParaRPr lang="en-US" sz="3200" dirty="0" smtClean="0"/>
+          </a:p>
+          <a:p>
+            <a:pPr marL="457200" indent="-457200" fontAlgn="base">
+              <a:buFontTx/>
+              <a:buChar char="-"/>
+            </a:pPr>
+            <a:r>
+              <a:rPr lang="en-MY" sz="3200" dirty="0" smtClean="0"/>
+              <a:t>Abstract Classes - Dealing in Ideas</a:t>
+            </a:r>
+          </a:p>
+          <a:p>
+            <a:pPr marL="457200" indent="-457200" fontAlgn="base">
+              <a:buFontTx/>
+              <a:buChar char="-"/>
+            </a:pPr>
+            <a:r>
+              <a:rPr lang="en-MY" sz="3200" dirty="0"/>
+              <a:t>Inheritance </a:t>
+            </a:r>
+            <a:r>
+              <a:rPr lang="en-MY" sz="3200" dirty="0" smtClean="0"/>
+              <a:t>– The Child Gets Everything</a:t>
+            </a:r>
+            <a:endParaRPr lang="en-MY" sz="3200" dirty="0"/>
+          </a:p>
+          <a:p>
+            <a:pPr marL="457200" indent="-457200" fontAlgn="base">
+              <a:buFontTx/>
+              <a:buChar char="-"/>
+            </a:pPr>
+            <a:r>
+              <a:rPr lang="en-MY" sz="3200" dirty="0"/>
+              <a:t>Polymorphism </a:t>
+            </a:r>
+            <a:r>
+              <a:rPr lang="en-MY" sz="3200" dirty="0" smtClean="0"/>
+              <a:t>(and </a:t>
+            </a:r>
+            <a:r>
+              <a:rPr lang="en-MY" sz="3200" dirty="0"/>
+              <a:t>the Idea That Something Can be Something Else (Related</a:t>
+            </a:r>
+            <a:r>
+              <a:rPr lang="en-MY" sz="3200" dirty="0" smtClean="0"/>
+              <a:t>))</a:t>
+            </a:r>
+            <a:endParaRPr lang="en-MY" sz="3200" dirty="0"/>
+          </a:p>
+          <a:p>
+            <a:pPr marL="457200" indent="-457200" fontAlgn="base">
+              <a:buFontTx/>
+              <a:buChar char="-"/>
+            </a:pPr>
+            <a:endParaRPr lang="en-MY" sz="3200" dirty="0" smtClean="0"/>
+          </a:p>
+        </p:txBody>
+      </p:sp>
+      <p:sp>
+        <p:nvSpPr>
+          <p:cNvPr id="5" name="TextBox 4"/>
+          <p:cNvSpPr txBox="1"/>
+          <p:nvPr/>
+        </p:nvSpPr>
+        <p:spPr>
+          <a:xfrm>
+            <a:off x="739739" y="503434"/>
+            <a:ext cx="2986651" cy="830997"/>
+          </a:xfrm>
+          <a:prstGeom prst="rect">
+            <a:avLst/>
+          </a:prstGeom>
+          <a:noFill/>
+        </p:spPr>
+        <p:txBody>
+          <a:bodyPr wrap="none" rtlCol="0">
+            <a:spAutoFit/>
+          </a:bodyPr>
+          <a:lstStyle/>
+          <a:p>
+            <a:r>
+              <a:rPr lang="en-US" sz="4800" dirty="0"/>
+              <a:t>Next week</a:t>
+            </a:r>
+            <a:r>
+              <a:rPr lang="en-US" sz="4800" dirty="0" smtClean="0"/>
+              <a:t>:</a:t>
+            </a:r>
+            <a:endParaRPr lang="en-US" sz="4800" dirty="0"/>
+          </a:p>
+        </p:txBody>
+      </p:sp>
+    </p:spTree>
+    <p:extLst>
+      <p:ext uri="{BB962C8B-B14F-4D97-AF65-F5344CB8AC3E}">
+        <p14:creationId xmlns:p14="http://schemas.microsoft.com/office/powerpoint/2010/main" val="11900343"/>
+      </p:ext>
+    </p:extLst>
   </p:cSld>
   <p:clrMapOvr>
     <a:masterClrMapping/>
@@ -3120,7 +3716,14 @@
         <p:cNvGrpSpPr/>
         <p:nvPr/>
       </p:nvGrpSpPr>
-      <p:grpSpPr/>
+      <p:grpSpPr>
+        <a:xfrm>
+          <a:off x="0" y="0"/>
+          <a:ext cx="0" cy="0"/>
+          <a:chOff x="0" y="0"/>
+          <a:chExt cx="0" cy="0"/>
+        </a:xfrm>
+      </p:grpSpPr>
       <p:sp>
         <p:nvSpPr>
           <p:cNvPr id="4" name="Text Box 3"/>
@@ -3129,8 +3732,8 @@
         </p:nvSpPr>
         <p:spPr>
           <a:xfrm>
-            <a:off x="229870" y="297815"/>
-            <a:ext cx="5403215" cy="1558925"/>
+            <a:off x="0" y="390283"/>
+            <a:ext cx="7712052" cy="769441"/>
           </a:xfrm>
           <a:prstGeom prst="rect">
             <a:avLst/>
@@ -3141,17 +3744,1382 @@
           <a:bodyPr wrap="square" rtlCol="0">
             <a:spAutoFit/>
           </a:bodyPr>
+          <a:lstStyle/>
           <a:p>
             <a:pPr algn="ctr"/>
             <a:r>
-              <a:rPr lang="en-MY" altLang="en-US" sz="3200"/>
-              <a:t>Java Objects and Classes - Why they're the most convenient thing to happen to coding.</a:t>
-            </a:r>
-            <a:endParaRPr lang="en-MY" altLang="en-US" sz="3200"/>
+              <a:rPr lang="en-US" altLang="en-US" sz="4400" dirty="0" smtClean="0"/>
+              <a:t>Object Oriented Programming</a:t>
+            </a:r>
+          </a:p>
+        </p:txBody>
+      </p:sp>
+      <p:sp>
+        <p:nvSpPr>
+          <p:cNvPr id="3" name="Rectangle 2"/>
+          <p:cNvSpPr/>
+          <p:nvPr/>
+        </p:nvSpPr>
+        <p:spPr>
+          <a:xfrm>
+            <a:off x="1705511" y="2569034"/>
+            <a:ext cx="5861407" cy="1938992"/>
+          </a:xfrm>
+          <a:prstGeom prst="rect">
+            <a:avLst/>
+          </a:prstGeom>
+        </p:spPr>
+        <p:txBody>
+          <a:bodyPr wrap="square">
+            <a:spAutoFit/>
+          </a:bodyPr>
+          <a:lstStyle/>
+          <a:p>
+            <a:r>
+              <a:rPr lang="en-MY" sz="2400" i="1" dirty="0" smtClean="0">
+                <a:solidFill>
+                  <a:srgbClr val="333333"/>
+                </a:solidFill>
+                <a:latin typeface="Helvetica Neue"/>
+              </a:rPr>
+              <a:t>“A</a:t>
+            </a:r>
+            <a:r>
+              <a:rPr lang="en-MY" sz="2400" i="1" dirty="0">
+                <a:solidFill>
+                  <a:srgbClr val="333333"/>
+                </a:solidFill>
+                <a:latin typeface="Helvetica Neue"/>
+              </a:rPr>
+              <a:t> programming paradigm based on the concept of "objects", which may contain data, in the form of fields, often known as </a:t>
+            </a:r>
+            <a:r>
+              <a:rPr lang="en-MY" sz="2400" b="1" i="1" dirty="0">
+                <a:solidFill>
+                  <a:srgbClr val="333333"/>
+                </a:solidFill>
+                <a:latin typeface="Helvetica Neue"/>
+              </a:rPr>
+              <a:t>attributes</a:t>
+            </a:r>
+            <a:r>
+              <a:rPr lang="en-MY" sz="2400" i="1" dirty="0">
+                <a:solidFill>
+                  <a:srgbClr val="333333"/>
+                </a:solidFill>
+                <a:latin typeface="Helvetica Neue"/>
+              </a:rPr>
+              <a:t>; and code, in the form of procedures, often known as </a:t>
+            </a:r>
+            <a:r>
+              <a:rPr lang="en-MY" sz="2400" b="1" i="1" dirty="0">
+                <a:solidFill>
+                  <a:srgbClr val="333333"/>
+                </a:solidFill>
+                <a:latin typeface="Helvetica Neue"/>
+              </a:rPr>
+              <a:t>methods</a:t>
+            </a:r>
+            <a:r>
+              <a:rPr lang="en-MY" sz="2400" i="1" dirty="0" smtClean="0">
+                <a:solidFill>
+                  <a:srgbClr val="333333"/>
+                </a:solidFill>
+                <a:latin typeface="Helvetica Neue"/>
+              </a:rPr>
+              <a:t>.”</a:t>
+            </a:r>
+            <a:endParaRPr lang="en-MY" sz="2400" dirty="0"/>
+          </a:p>
+        </p:txBody>
+      </p:sp>
+      <p:sp>
+        <p:nvSpPr>
+          <p:cNvPr id="5" name="TextBox 4"/>
+          <p:cNvSpPr txBox="1"/>
+          <p:nvPr/>
+        </p:nvSpPr>
+        <p:spPr>
+          <a:xfrm>
+            <a:off x="945222" y="1602769"/>
+            <a:ext cx="3517053" cy="523220"/>
+          </a:xfrm>
+          <a:prstGeom prst="rect">
+            <a:avLst/>
+          </a:prstGeom>
+          <a:noFill/>
+        </p:spPr>
+        <p:txBody>
+          <a:bodyPr wrap="none" rtlCol="0">
+            <a:spAutoFit/>
+          </a:bodyPr>
+          <a:lstStyle/>
+          <a:p>
+            <a:r>
+              <a:rPr lang="en-US" sz="2800" dirty="0" smtClean="0"/>
+              <a:t>The official definition…</a:t>
+            </a:r>
+            <a:endParaRPr lang="en-MY" sz="2800" dirty="0"/>
+          </a:p>
+        </p:txBody>
+      </p:sp>
+      <p:sp>
+        <p:nvSpPr>
+          <p:cNvPr id="6" name="TextBox 5"/>
+          <p:cNvSpPr txBox="1"/>
+          <p:nvPr/>
+        </p:nvSpPr>
+        <p:spPr>
+          <a:xfrm>
+            <a:off x="2442908" y="4951071"/>
+            <a:ext cx="4038734" cy="584775"/>
+          </a:xfrm>
+          <a:prstGeom prst="rect">
+            <a:avLst/>
+          </a:prstGeom>
+          <a:noFill/>
+        </p:spPr>
+        <p:txBody>
+          <a:bodyPr wrap="none" rtlCol="0">
+            <a:spAutoFit/>
+          </a:bodyPr>
+          <a:lstStyle/>
+          <a:p>
+            <a:r>
+              <a:rPr lang="en-US" sz="3200" dirty="0" smtClean="0"/>
+              <a:t>… but what is it, really?</a:t>
+            </a:r>
+            <a:endParaRPr lang="en-MY" sz="3200" dirty="0"/>
           </a:p>
         </p:txBody>
       </p:sp>
     </p:spTree>
+  </p:cSld>
+  <p:clrMapOvr>
+    <a:masterClrMapping/>
+  </p:clrMapOvr>
+</p:sld>
+</file>
+
+<file path=ppt/slides/slide3.xml><?xml version="1.0" encoding="utf-8"?>
+<p:sld xmlns:a="http://schemas.openxmlformats.org/drawingml/2006/main" xmlns:r="http://schemas.openxmlformats.org/officeDocument/2006/relationships" xmlns:p="http://schemas.openxmlformats.org/presentationml/2006/main">
+  <p:cSld>
+    <p:spTree>
+      <p:nvGrpSpPr>
+        <p:cNvPr id="1" name=""/>
+        <p:cNvGrpSpPr/>
+        <p:nvPr/>
+      </p:nvGrpSpPr>
+      <p:grpSpPr>
+        <a:xfrm>
+          <a:off x="0" y="0"/>
+          <a:ext cx="0" cy="0"/>
+          <a:chOff x="0" y="0"/>
+          <a:chExt cx="0" cy="0"/>
+        </a:xfrm>
+      </p:grpSpPr>
+      <p:sp>
+        <p:nvSpPr>
+          <p:cNvPr id="4" name="Text Box 3"/>
+          <p:cNvSpPr txBox="1"/>
+          <p:nvPr/>
+        </p:nvSpPr>
+        <p:spPr>
+          <a:xfrm>
+            <a:off x="0" y="390283"/>
+            <a:ext cx="7712052" cy="769441"/>
+          </a:xfrm>
+          <a:prstGeom prst="rect">
+            <a:avLst/>
+          </a:prstGeom>
+          <a:noFill/>
+        </p:spPr>
+        <p:txBody>
+          <a:bodyPr wrap="square" rtlCol="0">
+            <a:spAutoFit/>
+          </a:bodyPr>
+          <a:lstStyle/>
+          <a:p>
+            <a:pPr algn="ctr"/>
+            <a:r>
+              <a:rPr lang="en-US" altLang="en-US" sz="4400" dirty="0" smtClean="0"/>
+              <a:t>Object Oriented Programming</a:t>
+            </a:r>
+          </a:p>
+        </p:txBody>
+      </p:sp>
+      <p:pic>
+        <p:nvPicPr>
+          <p:cNvPr id="5" name="Picture 4"/>
+          <p:cNvPicPr>
+            <a:picLocks noChangeAspect="1"/>
+          </p:cNvPicPr>
+          <p:nvPr/>
+        </p:nvPicPr>
+        <p:blipFill>
+          <a:blip r:embed="rId2">
+            <a:extLst>
+              <a:ext uri="{28A0092B-C50C-407E-A947-70E740481C1C}">
+                <a14:useLocalDpi xmlns:a14="http://schemas.microsoft.com/office/drawing/2010/main" val="0"/>
+              </a:ext>
+            </a:extLst>
+          </a:blip>
+          <a:stretch>
+            <a:fillRect/>
+          </a:stretch>
+        </p:blipFill>
+        <p:spPr>
+          <a:xfrm>
+            <a:off x="1218137" y="1869896"/>
+            <a:ext cx="3066186" cy="3066186"/>
+          </a:xfrm>
+          <a:prstGeom prst="rect">
+            <a:avLst/>
+          </a:prstGeom>
+        </p:spPr>
+      </p:pic>
+      <p:sp>
+        <p:nvSpPr>
+          <p:cNvPr id="8" name="TextBox 7"/>
+          <p:cNvSpPr txBox="1"/>
+          <p:nvPr/>
+        </p:nvSpPr>
+        <p:spPr>
+          <a:xfrm>
+            <a:off x="5208998" y="1633274"/>
+            <a:ext cx="2279278" cy="3539430"/>
+          </a:xfrm>
+          <a:prstGeom prst="rect">
+            <a:avLst/>
+          </a:prstGeom>
+          <a:noFill/>
+        </p:spPr>
+        <p:txBody>
+          <a:bodyPr wrap="none" rtlCol="0">
+            <a:spAutoFit/>
+          </a:bodyPr>
+          <a:lstStyle/>
+          <a:p>
+            <a:r>
+              <a:rPr lang="en-US" sz="2800" i="1" dirty="0" smtClean="0"/>
+              <a:t>Attributes</a:t>
+            </a:r>
+          </a:p>
+          <a:p>
+            <a:pPr marL="285750" indent="-285750">
+              <a:buFontTx/>
+              <a:buChar char="-"/>
+            </a:pPr>
+            <a:r>
+              <a:rPr lang="en-US" sz="2800" dirty="0" smtClean="0"/>
+              <a:t>Radius</a:t>
+            </a:r>
+          </a:p>
+          <a:p>
+            <a:pPr marL="285750" indent="-285750">
+              <a:buFontTx/>
+              <a:buChar char="-"/>
+            </a:pPr>
+            <a:r>
+              <a:rPr lang="en-US" sz="2800" dirty="0" smtClean="0"/>
+              <a:t>Surface area</a:t>
+            </a:r>
+          </a:p>
+          <a:p>
+            <a:pPr marL="285750" indent="-285750">
+              <a:buFontTx/>
+              <a:buChar char="-"/>
+            </a:pPr>
+            <a:r>
+              <a:rPr lang="en-US" sz="2800" dirty="0" smtClean="0"/>
+              <a:t>Volume</a:t>
+            </a:r>
+          </a:p>
+          <a:p>
+            <a:endParaRPr lang="en-US" sz="2800" dirty="0" smtClean="0"/>
+          </a:p>
+          <a:p>
+            <a:r>
+              <a:rPr lang="en-US" sz="2800" i="1" dirty="0" smtClean="0"/>
+              <a:t>Methods</a:t>
+            </a:r>
+          </a:p>
+          <a:p>
+            <a:pPr marL="285750" indent="-285750">
+              <a:buFontTx/>
+              <a:buChar char="-"/>
+            </a:pPr>
+            <a:r>
+              <a:rPr lang="en-US" sz="2800" dirty="0" smtClean="0"/>
+              <a:t>Bounce</a:t>
+            </a:r>
+          </a:p>
+          <a:p>
+            <a:pPr marL="285750" indent="-285750">
+              <a:buFontTx/>
+              <a:buChar char="-"/>
+            </a:pPr>
+            <a:r>
+              <a:rPr lang="en-US" sz="2800" dirty="0" smtClean="0"/>
+              <a:t>Burst</a:t>
+            </a:r>
+          </a:p>
+        </p:txBody>
+      </p:sp>
+    </p:spTree>
+    <p:extLst>
+      <p:ext uri="{BB962C8B-B14F-4D97-AF65-F5344CB8AC3E}">
+        <p14:creationId xmlns:p14="http://schemas.microsoft.com/office/powerpoint/2010/main" val="871571267"/>
+      </p:ext>
+    </p:extLst>
+  </p:cSld>
+  <p:clrMapOvr>
+    <a:masterClrMapping/>
+  </p:clrMapOvr>
+</p:sld>
+</file>
+
+<file path=ppt/slides/slide4.xml><?xml version="1.0" encoding="utf-8"?>
+<p:sld xmlns:a="http://schemas.openxmlformats.org/drawingml/2006/main" xmlns:r="http://schemas.openxmlformats.org/officeDocument/2006/relationships" xmlns:p="http://schemas.openxmlformats.org/presentationml/2006/main">
+  <p:cSld>
+    <p:spTree>
+      <p:nvGrpSpPr>
+        <p:cNvPr id="1" name=""/>
+        <p:cNvGrpSpPr/>
+        <p:nvPr/>
+      </p:nvGrpSpPr>
+      <p:grpSpPr>
+        <a:xfrm>
+          <a:off x="0" y="0"/>
+          <a:ext cx="0" cy="0"/>
+          <a:chOff x="0" y="0"/>
+          <a:chExt cx="0" cy="0"/>
+        </a:xfrm>
+      </p:grpSpPr>
+      <p:sp>
+        <p:nvSpPr>
+          <p:cNvPr id="4" name="Text Box 3"/>
+          <p:cNvSpPr txBox="1"/>
+          <p:nvPr/>
+        </p:nvSpPr>
+        <p:spPr>
+          <a:xfrm>
+            <a:off x="0" y="390283"/>
+            <a:ext cx="7712052" cy="769441"/>
+          </a:xfrm>
+          <a:prstGeom prst="rect">
+            <a:avLst/>
+          </a:prstGeom>
+          <a:noFill/>
+        </p:spPr>
+        <p:txBody>
+          <a:bodyPr wrap="square" rtlCol="0">
+            <a:spAutoFit/>
+          </a:bodyPr>
+          <a:lstStyle/>
+          <a:p>
+            <a:pPr algn="ctr"/>
+            <a:r>
+              <a:rPr lang="en-US" altLang="en-US" sz="4400" dirty="0" smtClean="0"/>
+              <a:t>Object Oriented Programming</a:t>
+            </a:r>
+          </a:p>
+        </p:txBody>
+      </p:sp>
+      <p:pic>
+        <p:nvPicPr>
+          <p:cNvPr id="5" name="Picture 4"/>
+          <p:cNvPicPr>
+            <a:picLocks noChangeAspect="1"/>
+          </p:cNvPicPr>
+          <p:nvPr/>
+        </p:nvPicPr>
+        <p:blipFill>
+          <a:blip r:embed="rId2">
+            <a:extLst>
+              <a:ext uri="{28A0092B-C50C-407E-A947-70E740481C1C}">
+                <a14:useLocalDpi xmlns:a14="http://schemas.microsoft.com/office/drawing/2010/main" val="0"/>
+              </a:ext>
+            </a:extLst>
+          </a:blip>
+          <a:stretch>
+            <a:fillRect/>
+          </a:stretch>
+        </p:blipFill>
+        <p:spPr>
+          <a:xfrm>
+            <a:off x="1687809" y="1660727"/>
+            <a:ext cx="5055622" cy="4082527"/>
+          </a:xfrm>
+          <a:prstGeom prst="rect">
+            <a:avLst/>
+          </a:prstGeom>
+        </p:spPr>
+      </p:pic>
+    </p:spTree>
+    <p:extLst>
+      <p:ext uri="{BB962C8B-B14F-4D97-AF65-F5344CB8AC3E}">
+        <p14:creationId xmlns:p14="http://schemas.microsoft.com/office/powerpoint/2010/main" val="3111895138"/>
+      </p:ext>
+    </p:extLst>
+  </p:cSld>
+  <p:clrMapOvr>
+    <a:masterClrMapping/>
+  </p:clrMapOvr>
+</p:sld>
+</file>
+
+<file path=ppt/slides/slide5.xml><?xml version="1.0" encoding="utf-8"?>
+<p:sld xmlns:a="http://schemas.openxmlformats.org/drawingml/2006/main" xmlns:r="http://schemas.openxmlformats.org/officeDocument/2006/relationships" xmlns:p="http://schemas.openxmlformats.org/presentationml/2006/main">
+  <p:cSld>
+    <p:spTree>
+      <p:nvGrpSpPr>
+        <p:cNvPr id="1" name=""/>
+        <p:cNvGrpSpPr/>
+        <p:nvPr/>
+      </p:nvGrpSpPr>
+      <p:grpSpPr>
+        <a:xfrm>
+          <a:off x="0" y="0"/>
+          <a:ext cx="0" cy="0"/>
+          <a:chOff x="0" y="0"/>
+          <a:chExt cx="0" cy="0"/>
+        </a:xfrm>
+      </p:grpSpPr>
+      <p:sp>
+        <p:nvSpPr>
+          <p:cNvPr id="2" name="Text Box 3"/>
+          <p:cNvSpPr txBox="1"/>
+          <p:nvPr/>
+        </p:nvSpPr>
+        <p:spPr>
+          <a:xfrm>
+            <a:off x="482885" y="400557"/>
+            <a:ext cx="2753474" cy="769441"/>
+          </a:xfrm>
+          <a:prstGeom prst="rect">
+            <a:avLst/>
+          </a:prstGeom>
+          <a:noFill/>
+        </p:spPr>
+        <p:txBody>
+          <a:bodyPr wrap="square" rtlCol="0">
+            <a:spAutoFit/>
+          </a:bodyPr>
+          <a:lstStyle/>
+          <a:p>
+            <a:pPr algn="ctr"/>
+            <a:r>
+              <a:rPr lang="en-US" altLang="en-US" sz="4400" dirty="0" smtClean="0"/>
+              <a:t>Privacy</a:t>
+            </a:r>
+          </a:p>
+        </p:txBody>
+      </p:sp>
+      <p:sp>
+        <p:nvSpPr>
+          <p:cNvPr id="4" name="TextBox 3"/>
+          <p:cNvSpPr txBox="1"/>
+          <p:nvPr/>
+        </p:nvSpPr>
+        <p:spPr>
+          <a:xfrm>
+            <a:off x="1458931" y="1479479"/>
+            <a:ext cx="6596008" cy="830997"/>
+          </a:xfrm>
+          <a:prstGeom prst="rect">
+            <a:avLst/>
+          </a:prstGeom>
+          <a:noFill/>
+        </p:spPr>
+        <p:txBody>
+          <a:bodyPr wrap="square" rtlCol="0">
+            <a:spAutoFit/>
+          </a:bodyPr>
+          <a:lstStyle/>
+          <a:p>
+            <a:r>
+              <a:rPr lang="en-US" sz="2400" dirty="0" smtClean="0"/>
+              <a:t>Privacy is a big part of OOP – it allows or disallows easy editing or sight of certain variables…</a:t>
+            </a:r>
+            <a:endParaRPr lang="en-MY" sz="2400" dirty="0"/>
+          </a:p>
+        </p:txBody>
+      </p:sp>
+      <p:pic>
+        <p:nvPicPr>
+          <p:cNvPr id="5" name="Picture 4"/>
+          <p:cNvPicPr>
+            <a:picLocks noChangeAspect="1"/>
+          </p:cNvPicPr>
+          <p:nvPr/>
+        </p:nvPicPr>
+        <p:blipFill>
+          <a:blip r:embed="rId2">
+            <a:extLst>
+              <a:ext uri="{28A0092B-C50C-407E-A947-70E740481C1C}">
+                <a14:useLocalDpi xmlns:a14="http://schemas.microsoft.com/office/drawing/2010/main" val="0"/>
+              </a:ext>
+            </a:extLst>
+          </a:blip>
+          <a:stretch>
+            <a:fillRect/>
+          </a:stretch>
+        </p:blipFill>
+        <p:spPr>
+          <a:xfrm>
+            <a:off x="3211255" y="2619956"/>
+            <a:ext cx="4453266" cy="3596111"/>
+          </a:xfrm>
+          <a:prstGeom prst="rect">
+            <a:avLst/>
+          </a:prstGeom>
+        </p:spPr>
+      </p:pic>
+      <p:sp>
+        <p:nvSpPr>
+          <p:cNvPr id="6" name="TextBox 5"/>
+          <p:cNvSpPr txBox="1"/>
+          <p:nvPr/>
+        </p:nvSpPr>
+        <p:spPr>
+          <a:xfrm>
+            <a:off x="1299681" y="2979506"/>
+            <a:ext cx="1119882" cy="1631216"/>
+          </a:xfrm>
+          <a:prstGeom prst="rect">
+            <a:avLst/>
+          </a:prstGeom>
+          <a:noFill/>
+        </p:spPr>
+        <p:txBody>
+          <a:bodyPr wrap="square" rtlCol="0">
+            <a:spAutoFit/>
+          </a:bodyPr>
+          <a:lstStyle/>
+          <a:p>
+            <a:r>
+              <a:rPr lang="en-US" sz="2000" dirty="0" smtClean="0"/>
+              <a:t>Bear with me and look at this again…</a:t>
+            </a:r>
+            <a:endParaRPr lang="en-MY" sz="2000" dirty="0"/>
+          </a:p>
+        </p:txBody>
+      </p:sp>
+      <p:sp>
+        <p:nvSpPr>
+          <p:cNvPr id="7" name="Rectangle 6"/>
+          <p:cNvSpPr/>
+          <p:nvPr/>
+        </p:nvSpPr>
+        <p:spPr>
+          <a:xfrm>
+            <a:off x="3476625" y="2885179"/>
+            <a:ext cx="514350" cy="188654"/>
+          </a:xfrm>
+          <a:prstGeom prst="rect">
+            <a:avLst/>
+          </a:prstGeom>
+          <a:noFill/>
+          <a:ln>
+            <a:solidFill>
+              <a:schemeClr val="accent1">
+                <a:lumMod val="50000"/>
+              </a:schemeClr>
+            </a:solidFill>
+          </a:ln>
+        </p:spPr>
+        <p:style>
+          <a:lnRef idx="2">
+            <a:schemeClr val="accent6"/>
+          </a:lnRef>
+          <a:fillRef idx="1">
+            <a:schemeClr val="lt1"/>
+          </a:fillRef>
+          <a:effectRef idx="0">
+            <a:schemeClr val="accent6"/>
+          </a:effectRef>
+          <a:fontRef idx="minor">
+            <a:schemeClr val="dk1"/>
+          </a:fontRef>
+        </p:style>
+        <p:txBody>
+          <a:bodyPr rtlCol="0" anchor="ctr"/>
+          <a:lstStyle/>
+          <a:p>
+            <a:pPr algn="ctr"/>
+            <a:endParaRPr lang="en-MY"/>
+          </a:p>
+        </p:txBody>
+      </p:sp>
+      <p:sp>
+        <p:nvSpPr>
+          <p:cNvPr id="8" name="Rectangle 7"/>
+          <p:cNvSpPr/>
+          <p:nvPr/>
+        </p:nvSpPr>
+        <p:spPr>
+          <a:xfrm>
+            <a:off x="3476625" y="3442753"/>
+            <a:ext cx="552450" cy="226031"/>
+          </a:xfrm>
+          <a:prstGeom prst="rect">
+            <a:avLst/>
+          </a:prstGeom>
+          <a:noFill/>
+          <a:ln>
+            <a:solidFill>
+              <a:schemeClr val="accent1">
+                <a:lumMod val="50000"/>
+              </a:schemeClr>
+            </a:solidFill>
+          </a:ln>
+        </p:spPr>
+        <p:style>
+          <a:lnRef idx="2">
+            <a:schemeClr val="accent6"/>
+          </a:lnRef>
+          <a:fillRef idx="1">
+            <a:schemeClr val="lt1"/>
+          </a:fillRef>
+          <a:effectRef idx="0">
+            <a:schemeClr val="accent6"/>
+          </a:effectRef>
+          <a:fontRef idx="minor">
+            <a:schemeClr val="dk1"/>
+          </a:fontRef>
+        </p:style>
+        <p:txBody>
+          <a:bodyPr rtlCol="0" anchor="ctr"/>
+          <a:lstStyle/>
+          <a:p>
+            <a:pPr algn="ctr"/>
+            <a:endParaRPr lang="en-MY"/>
+          </a:p>
+        </p:txBody>
+      </p:sp>
+      <p:sp>
+        <p:nvSpPr>
+          <p:cNvPr id="9" name="Rectangle 8"/>
+          <p:cNvSpPr/>
+          <p:nvPr/>
+        </p:nvSpPr>
+        <p:spPr>
+          <a:xfrm>
+            <a:off x="3476625" y="4829410"/>
+            <a:ext cx="716756" cy="152165"/>
+          </a:xfrm>
+          <a:prstGeom prst="rect">
+            <a:avLst/>
+          </a:prstGeom>
+          <a:noFill/>
+          <a:ln>
+            <a:solidFill>
+              <a:schemeClr val="accent1">
+                <a:lumMod val="50000"/>
+              </a:schemeClr>
+            </a:solidFill>
+          </a:ln>
+        </p:spPr>
+        <p:style>
+          <a:lnRef idx="2">
+            <a:schemeClr val="accent6"/>
+          </a:lnRef>
+          <a:fillRef idx="1">
+            <a:schemeClr val="lt1"/>
+          </a:fillRef>
+          <a:effectRef idx="0">
+            <a:schemeClr val="accent6"/>
+          </a:effectRef>
+          <a:fontRef idx="minor">
+            <a:schemeClr val="dk1"/>
+          </a:fontRef>
+        </p:style>
+        <p:txBody>
+          <a:bodyPr rtlCol="0" anchor="ctr"/>
+          <a:lstStyle/>
+          <a:p>
+            <a:pPr algn="ctr"/>
+            <a:endParaRPr lang="en-MY"/>
+          </a:p>
+        </p:txBody>
+      </p:sp>
+    </p:spTree>
+    <p:extLst>
+      <p:ext uri="{BB962C8B-B14F-4D97-AF65-F5344CB8AC3E}">
+        <p14:creationId xmlns:p14="http://schemas.microsoft.com/office/powerpoint/2010/main" val="2307597203"/>
+      </p:ext>
+    </p:extLst>
+  </p:cSld>
+  <p:clrMapOvr>
+    <a:masterClrMapping/>
+  </p:clrMapOvr>
+</p:sld>
+</file>
+
+<file path=ppt/slides/slide6.xml><?xml version="1.0" encoding="utf-8"?>
+<p:sld xmlns:a="http://schemas.openxmlformats.org/drawingml/2006/main" xmlns:r="http://schemas.openxmlformats.org/officeDocument/2006/relationships" xmlns:p="http://schemas.openxmlformats.org/presentationml/2006/main">
+  <p:cSld>
+    <p:spTree>
+      <p:nvGrpSpPr>
+        <p:cNvPr id="1" name=""/>
+        <p:cNvGrpSpPr/>
+        <p:nvPr/>
+      </p:nvGrpSpPr>
+      <p:grpSpPr>
+        <a:xfrm>
+          <a:off x="0" y="0"/>
+          <a:ext cx="0" cy="0"/>
+          <a:chOff x="0" y="0"/>
+          <a:chExt cx="0" cy="0"/>
+        </a:xfrm>
+      </p:grpSpPr>
+      <p:sp>
+        <p:nvSpPr>
+          <p:cNvPr id="2" name="Text Box 3"/>
+          <p:cNvSpPr txBox="1"/>
+          <p:nvPr/>
+        </p:nvSpPr>
+        <p:spPr>
+          <a:xfrm>
+            <a:off x="482885" y="400557"/>
+            <a:ext cx="2753474" cy="769441"/>
+          </a:xfrm>
+          <a:prstGeom prst="rect">
+            <a:avLst/>
+          </a:prstGeom>
+          <a:noFill/>
+        </p:spPr>
+        <p:txBody>
+          <a:bodyPr wrap="square" rtlCol="0">
+            <a:spAutoFit/>
+          </a:bodyPr>
+          <a:lstStyle/>
+          <a:p>
+            <a:pPr algn="ctr"/>
+            <a:r>
+              <a:rPr lang="en-US" altLang="en-US" sz="4400" dirty="0" smtClean="0"/>
+              <a:t>Privacy</a:t>
+            </a:r>
+          </a:p>
+        </p:txBody>
+      </p:sp>
+      <p:pic>
+        <p:nvPicPr>
+          <p:cNvPr id="6" name="Picture 5"/>
+          <p:cNvPicPr>
+            <a:picLocks noChangeAspect="1"/>
+          </p:cNvPicPr>
+          <p:nvPr/>
+        </p:nvPicPr>
+        <p:blipFill>
+          <a:blip r:embed="rId2">
+            <a:extLst>
+              <a:ext uri="{28A0092B-C50C-407E-A947-70E740481C1C}">
+                <a14:useLocalDpi xmlns:a14="http://schemas.microsoft.com/office/drawing/2010/main" val="0"/>
+              </a:ext>
+            </a:extLst>
+          </a:blip>
+          <a:stretch>
+            <a:fillRect/>
+          </a:stretch>
+        </p:blipFill>
+        <p:spPr>
+          <a:xfrm>
+            <a:off x="1608887" y="1999464"/>
+            <a:ext cx="5929778" cy="2808842"/>
+          </a:xfrm>
+          <a:prstGeom prst="rect">
+            <a:avLst/>
+          </a:prstGeom>
+        </p:spPr>
+      </p:pic>
+    </p:spTree>
+    <p:extLst>
+      <p:ext uri="{BB962C8B-B14F-4D97-AF65-F5344CB8AC3E}">
+        <p14:creationId xmlns:p14="http://schemas.microsoft.com/office/powerpoint/2010/main" val="2347293265"/>
+      </p:ext>
+    </p:extLst>
+  </p:cSld>
+  <p:clrMapOvr>
+    <a:masterClrMapping/>
+  </p:clrMapOvr>
+</p:sld>
+</file>
+
+<file path=ppt/slides/slide7.xml><?xml version="1.0" encoding="utf-8"?>
+<p:sld xmlns:a="http://schemas.openxmlformats.org/drawingml/2006/main" xmlns:r="http://schemas.openxmlformats.org/officeDocument/2006/relationships" xmlns:p="http://schemas.openxmlformats.org/presentationml/2006/main">
+  <p:cSld>
+    <p:spTree>
+      <p:nvGrpSpPr>
+        <p:cNvPr id="1" name=""/>
+        <p:cNvGrpSpPr/>
+        <p:nvPr/>
+      </p:nvGrpSpPr>
+      <p:grpSpPr>
+        <a:xfrm>
+          <a:off x="0" y="0"/>
+          <a:ext cx="0" cy="0"/>
+          <a:chOff x="0" y="0"/>
+          <a:chExt cx="0" cy="0"/>
+        </a:xfrm>
+      </p:grpSpPr>
+      <p:sp>
+        <p:nvSpPr>
+          <p:cNvPr id="2" name="Text Box 3"/>
+          <p:cNvSpPr txBox="1"/>
+          <p:nvPr/>
+        </p:nvSpPr>
+        <p:spPr>
+          <a:xfrm>
+            <a:off x="482884" y="400557"/>
+            <a:ext cx="4469259" cy="769441"/>
+          </a:xfrm>
+          <a:prstGeom prst="rect">
+            <a:avLst/>
+          </a:prstGeom>
+          <a:noFill/>
+        </p:spPr>
+        <p:txBody>
+          <a:bodyPr wrap="square" rtlCol="0">
+            <a:spAutoFit/>
+          </a:bodyPr>
+          <a:lstStyle/>
+          <a:p>
+            <a:pPr algn="ctr"/>
+            <a:r>
+              <a:rPr lang="en-US" altLang="en-US" sz="4400" dirty="0" smtClean="0"/>
+              <a:t>Privacy </a:t>
+            </a:r>
+            <a:r>
+              <a:rPr lang="en-US" altLang="en-US" sz="1200" dirty="0" smtClean="0"/>
+              <a:t>works differently in Java than C++ btw</a:t>
+            </a:r>
+            <a:endParaRPr lang="en-US" altLang="en-US" sz="4400" dirty="0" smtClean="0"/>
+          </a:p>
+        </p:txBody>
+      </p:sp>
+      <p:sp>
+        <p:nvSpPr>
+          <p:cNvPr id="3" name="TextBox 2"/>
+          <p:cNvSpPr txBox="1"/>
+          <p:nvPr/>
+        </p:nvSpPr>
+        <p:spPr>
+          <a:xfrm>
+            <a:off x="1265274" y="1499550"/>
+            <a:ext cx="7114077" cy="1815882"/>
+          </a:xfrm>
+          <a:prstGeom prst="rect">
+            <a:avLst/>
+          </a:prstGeom>
+          <a:noFill/>
+        </p:spPr>
+        <p:txBody>
+          <a:bodyPr wrap="square" rtlCol="0">
+            <a:spAutoFit/>
+          </a:bodyPr>
+          <a:lstStyle/>
+          <a:p>
+            <a:r>
+              <a:rPr lang="en-US" sz="2800" dirty="0" smtClean="0"/>
+              <a:t>Public variable</a:t>
+            </a:r>
+          </a:p>
+          <a:p>
+            <a:r>
+              <a:rPr lang="en-US" sz="2800" dirty="0" smtClean="0"/>
+              <a:t>- Anyone in and outside the class can access, edit and see it – yes, even the entire project workspace.</a:t>
+            </a:r>
+            <a:endParaRPr lang="en-MY" sz="2800" dirty="0"/>
+          </a:p>
+        </p:txBody>
+      </p:sp>
+      <p:sp>
+        <p:nvSpPr>
+          <p:cNvPr id="4" name="TextBox 3"/>
+          <p:cNvSpPr txBox="1"/>
+          <p:nvPr/>
+        </p:nvSpPr>
+        <p:spPr>
+          <a:xfrm>
+            <a:off x="1265274" y="3315432"/>
+            <a:ext cx="6965879" cy="1384995"/>
+          </a:xfrm>
+          <a:prstGeom prst="rect">
+            <a:avLst/>
+          </a:prstGeom>
+          <a:noFill/>
+        </p:spPr>
+        <p:txBody>
+          <a:bodyPr wrap="square" rtlCol="0">
+            <a:spAutoFit/>
+          </a:bodyPr>
+          <a:lstStyle/>
+          <a:p>
+            <a:r>
+              <a:rPr lang="en-US" sz="2800" dirty="0" smtClean="0"/>
+              <a:t>Protected variable</a:t>
+            </a:r>
+          </a:p>
+          <a:p>
+            <a:r>
+              <a:rPr lang="en-US" sz="2800" dirty="0" smtClean="0"/>
+              <a:t>- The class, classes within the package, as well as subclasses can access, edit and see it.</a:t>
+            </a:r>
+          </a:p>
+        </p:txBody>
+      </p:sp>
+      <p:sp>
+        <p:nvSpPr>
+          <p:cNvPr id="5" name="TextBox 4"/>
+          <p:cNvSpPr txBox="1"/>
+          <p:nvPr/>
+        </p:nvSpPr>
+        <p:spPr>
+          <a:xfrm>
+            <a:off x="1265274" y="4797682"/>
+            <a:ext cx="7114077" cy="1384995"/>
+          </a:xfrm>
+          <a:prstGeom prst="rect">
+            <a:avLst/>
+          </a:prstGeom>
+          <a:noFill/>
+        </p:spPr>
+        <p:txBody>
+          <a:bodyPr wrap="square" rtlCol="0">
+            <a:spAutoFit/>
+          </a:bodyPr>
+          <a:lstStyle/>
+          <a:p>
+            <a:r>
+              <a:rPr lang="en-US" sz="2800" dirty="0" smtClean="0"/>
+              <a:t>Private variable</a:t>
+            </a:r>
+          </a:p>
+          <a:p>
+            <a:r>
+              <a:rPr lang="en-US" sz="2800" dirty="0" smtClean="0"/>
+              <a:t>- Only the class itself can access, edit and see it. Not even the class can allow others to see it. </a:t>
+            </a:r>
+            <a:endParaRPr lang="en-MY" sz="2800" dirty="0"/>
+          </a:p>
+        </p:txBody>
+      </p:sp>
+    </p:spTree>
+    <p:extLst>
+      <p:ext uri="{BB962C8B-B14F-4D97-AF65-F5344CB8AC3E}">
+        <p14:creationId xmlns:p14="http://schemas.microsoft.com/office/powerpoint/2010/main" val="4058276422"/>
+      </p:ext>
+    </p:extLst>
+  </p:cSld>
+  <p:clrMapOvr>
+    <a:masterClrMapping/>
+  </p:clrMapOvr>
+</p:sld>
+</file>
+
+<file path=ppt/slides/slide8.xml><?xml version="1.0" encoding="utf-8"?>
+<p:sld xmlns:a="http://schemas.openxmlformats.org/drawingml/2006/main" xmlns:r="http://schemas.openxmlformats.org/officeDocument/2006/relationships" xmlns:p="http://schemas.openxmlformats.org/presentationml/2006/main">
+  <p:cSld>
+    <p:spTree>
+      <p:nvGrpSpPr>
+        <p:cNvPr id="1" name=""/>
+        <p:cNvGrpSpPr/>
+        <p:nvPr/>
+      </p:nvGrpSpPr>
+      <p:grpSpPr>
+        <a:xfrm>
+          <a:off x="0" y="0"/>
+          <a:ext cx="0" cy="0"/>
+          <a:chOff x="0" y="0"/>
+          <a:chExt cx="0" cy="0"/>
+        </a:xfrm>
+      </p:grpSpPr>
+      <p:sp>
+        <p:nvSpPr>
+          <p:cNvPr id="2" name="Text Box 3"/>
+          <p:cNvSpPr txBox="1"/>
+          <p:nvPr/>
+        </p:nvSpPr>
+        <p:spPr>
+          <a:xfrm>
+            <a:off x="236306" y="359461"/>
+            <a:ext cx="2979506" cy="769441"/>
+          </a:xfrm>
+          <a:prstGeom prst="rect">
+            <a:avLst/>
+          </a:prstGeom>
+          <a:noFill/>
+        </p:spPr>
+        <p:txBody>
+          <a:bodyPr wrap="square" rtlCol="0">
+            <a:spAutoFit/>
+          </a:bodyPr>
+          <a:lstStyle/>
+          <a:p>
+            <a:pPr algn="ctr"/>
+            <a:r>
+              <a:rPr lang="en-US" altLang="en-US" sz="4400" dirty="0" smtClean="0"/>
+              <a:t>Packages</a:t>
+            </a:r>
+          </a:p>
+        </p:txBody>
+      </p:sp>
+      <p:sp>
+        <p:nvSpPr>
+          <p:cNvPr id="3" name="TextBox 2"/>
+          <p:cNvSpPr txBox="1"/>
+          <p:nvPr/>
+        </p:nvSpPr>
+        <p:spPr>
+          <a:xfrm>
+            <a:off x="832207" y="1315092"/>
+            <a:ext cx="7677936" cy="523220"/>
+          </a:xfrm>
+          <a:prstGeom prst="rect">
+            <a:avLst/>
+          </a:prstGeom>
+          <a:noFill/>
+        </p:spPr>
+        <p:txBody>
+          <a:bodyPr wrap="none" rtlCol="0">
+            <a:spAutoFit/>
+          </a:bodyPr>
+          <a:lstStyle/>
+          <a:p>
+            <a:r>
+              <a:rPr lang="en-US" sz="2800" dirty="0" smtClean="0"/>
+              <a:t>… I like to call them </a:t>
+            </a:r>
+            <a:r>
+              <a:rPr lang="en-US" sz="2800" dirty="0" err="1" smtClean="0"/>
+              <a:t>superfolders</a:t>
+            </a:r>
+            <a:r>
+              <a:rPr lang="en-US" sz="2800" dirty="0" smtClean="0"/>
+              <a:t>… for some reason.</a:t>
+            </a:r>
+            <a:endParaRPr lang="en-MY" sz="2800" dirty="0"/>
+          </a:p>
+        </p:txBody>
+      </p:sp>
+      <p:pic>
+        <p:nvPicPr>
+          <p:cNvPr id="5" name="Picture 4"/>
+          <p:cNvPicPr>
+            <a:picLocks noChangeAspect="1"/>
+          </p:cNvPicPr>
+          <p:nvPr/>
+        </p:nvPicPr>
+        <p:blipFill>
+          <a:blip r:embed="rId2">
+            <a:extLst>
+              <a:ext uri="{28A0092B-C50C-407E-A947-70E740481C1C}">
+                <a14:useLocalDpi xmlns:a14="http://schemas.microsoft.com/office/drawing/2010/main" val="0"/>
+              </a:ext>
+            </a:extLst>
+          </a:blip>
+          <a:stretch>
+            <a:fillRect/>
+          </a:stretch>
+        </p:blipFill>
+        <p:spPr>
+          <a:xfrm>
+            <a:off x="690875" y="2051859"/>
+            <a:ext cx="4209062" cy="1657111"/>
+          </a:xfrm>
+          <a:prstGeom prst="rect">
+            <a:avLst/>
+          </a:prstGeom>
+        </p:spPr>
+      </p:pic>
+      <p:cxnSp>
+        <p:nvCxnSpPr>
+          <p:cNvPr id="7" name="Straight Arrow Connector 6"/>
+          <p:cNvCxnSpPr/>
+          <p:nvPr/>
+        </p:nvCxnSpPr>
+        <p:spPr>
+          <a:xfrm>
+            <a:off x="3715653" y="3902461"/>
+            <a:ext cx="835299" cy="729466"/>
+          </a:xfrm>
+          <a:prstGeom prst="straightConnector1">
+            <a:avLst/>
+          </a:prstGeom>
+          <a:ln>
+            <a:tailEnd type="triangle"/>
+          </a:ln>
+        </p:spPr>
+        <p:style>
+          <a:lnRef idx="3">
+            <a:schemeClr val="dk1"/>
+          </a:lnRef>
+          <a:fillRef idx="0">
+            <a:schemeClr val="dk1"/>
+          </a:fillRef>
+          <a:effectRef idx="2">
+            <a:schemeClr val="dk1"/>
+          </a:effectRef>
+          <a:fontRef idx="minor">
+            <a:schemeClr val="tx1"/>
+          </a:fontRef>
+        </p:style>
+      </p:cxnSp>
+      <p:pic>
+        <p:nvPicPr>
+          <p:cNvPr id="8" name="Picture 7"/>
+          <p:cNvPicPr>
+            <a:picLocks noChangeAspect="1"/>
+          </p:cNvPicPr>
+          <p:nvPr/>
+        </p:nvPicPr>
+        <p:blipFill>
+          <a:blip r:embed="rId3">
+            <a:extLst>
+              <a:ext uri="{28A0092B-C50C-407E-A947-70E740481C1C}">
+                <a14:useLocalDpi xmlns:a14="http://schemas.microsoft.com/office/drawing/2010/main" val="0"/>
+              </a:ext>
+            </a:extLst>
+          </a:blip>
+          <a:stretch>
+            <a:fillRect/>
+          </a:stretch>
+        </p:blipFill>
+        <p:spPr>
+          <a:xfrm>
+            <a:off x="2274159" y="4825418"/>
+            <a:ext cx="4553585" cy="1648055"/>
+          </a:xfrm>
+          <a:prstGeom prst="rect">
+            <a:avLst/>
+          </a:prstGeom>
+        </p:spPr>
+      </p:pic>
+    </p:spTree>
+    <p:extLst>
+      <p:ext uri="{BB962C8B-B14F-4D97-AF65-F5344CB8AC3E}">
+        <p14:creationId xmlns:p14="http://schemas.microsoft.com/office/powerpoint/2010/main" val="3620468892"/>
+      </p:ext>
+    </p:extLst>
+  </p:cSld>
+  <p:clrMapOvr>
+    <a:masterClrMapping/>
+  </p:clrMapOvr>
+</p:sld>
+</file>
+
+<file path=ppt/slides/slide9.xml><?xml version="1.0" encoding="utf-8"?>
+<p:sld xmlns:a="http://schemas.openxmlformats.org/drawingml/2006/main" xmlns:r="http://schemas.openxmlformats.org/officeDocument/2006/relationships" xmlns:p="http://schemas.openxmlformats.org/presentationml/2006/main">
+  <p:cSld>
+    <p:spTree>
+      <p:nvGrpSpPr>
+        <p:cNvPr id="1" name=""/>
+        <p:cNvGrpSpPr/>
+        <p:nvPr/>
+      </p:nvGrpSpPr>
+      <p:grpSpPr>
+        <a:xfrm>
+          <a:off x="0" y="0"/>
+          <a:ext cx="0" cy="0"/>
+          <a:chOff x="0" y="0"/>
+          <a:chExt cx="0" cy="0"/>
+        </a:xfrm>
+      </p:grpSpPr>
+      <p:sp>
+        <p:nvSpPr>
+          <p:cNvPr id="2" name="Text Box 3"/>
+          <p:cNvSpPr txBox="1"/>
+          <p:nvPr/>
+        </p:nvSpPr>
+        <p:spPr>
+          <a:xfrm>
+            <a:off x="236306" y="359461"/>
+            <a:ext cx="2979506" cy="769441"/>
+          </a:xfrm>
+          <a:prstGeom prst="rect">
+            <a:avLst/>
+          </a:prstGeom>
+          <a:noFill/>
+        </p:spPr>
+        <p:txBody>
+          <a:bodyPr wrap="square" rtlCol="0">
+            <a:spAutoFit/>
+          </a:bodyPr>
+          <a:lstStyle/>
+          <a:p>
+            <a:pPr algn="ctr"/>
+            <a:r>
+              <a:rPr lang="en-US" altLang="en-US" sz="4400" dirty="0" smtClean="0"/>
+              <a:t>Packages</a:t>
+            </a:r>
+          </a:p>
+        </p:txBody>
+      </p:sp>
+      <p:sp>
+        <p:nvSpPr>
+          <p:cNvPr id="3" name="TextBox 2"/>
+          <p:cNvSpPr txBox="1"/>
+          <p:nvPr/>
+        </p:nvSpPr>
+        <p:spPr>
+          <a:xfrm>
+            <a:off x="904125" y="1294545"/>
+            <a:ext cx="7674796" cy="954107"/>
+          </a:xfrm>
+          <a:prstGeom prst="rect">
+            <a:avLst/>
+          </a:prstGeom>
+          <a:noFill/>
+        </p:spPr>
+        <p:txBody>
+          <a:bodyPr wrap="square" rtlCol="0">
+            <a:spAutoFit/>
+          </a:bodyPr>
+          <a:lstStyle/>
+          <a:p>
+            <a:r>
+              <a:rPr lang="en-US" sz="2800" dirty="0" smtClean="0"/>
+              <a:t>Java ships with a lot of packages as well… just import them</a:t>
+            </a:r>
+            <a:r>
+              <a:rPr lang="en-MY" sz="2800" dirty="0" smtClean="0"/>
+              <a:t>.</a:t>
+            </a:r>
+            <a:endParaRPr lang="en-US" sz="2800" dirty="0" smtClean="0"/>
+          </a:p>
+        </p:txBody>
+      </p:sp>
+      <p:pic>
+        <p:nvPicPr>
+          <p:cNvPr id="4" name="Picture 3"/>
+          <p:cNvPicPr>
+            <a:picLocks noChangeAspect="1"/>
+          </p:cNvPicPr>
+          <p:nvPr/>
+        </p:nvPicPr>
+        <p:blipFill>
+          <a:blip r:embed="rId2">
+            <a:extLst>
+              <a:ext uri="{28A0092B-C50C-407E-A947-70E740481C1C}">
+                <a14:useLocalDpi xmlns:a14="http://schemas.microsoft.com/office/drawing/2010/main" val="0"/>
+              </a:ext>
+            </a:extLst>
+          </a:blip>
+          <a:stretch>
+            <a:fillRect/>
+          </a:stretch>
+        </p:blipFill>
+        <p:spPr>
+          <a:xfrm>
+            <a:off x="1624777" y="2533841"/>
+            <a:ext cx="4087656" cy="375876"/>
+          </a:xfrm>
+          <a:prstGeom prst="rect">
+            <a:avLst/>
+          </a:prstGeom>
+        </p:spPr>
+      </p:pic>
+      <p:pic>
+        <p:nvPicPr>
+          <p:cNvPr id="5" name="Picture 4"/>
+          <p:cNvPicPr>
+            <a:picLocks noChangeAspect="1"/>
+          </p:cNvPicPr>
+          <p:nvPr/>
+        </p:nvPicPr>
+        <p:blipFill>
+          <a:blip r:embed="rId3">
+            <a:extLst>
+              <a:ext uri="{28A0092B-C50C-407E-A947-70E740481C1C}">
+                <a14:useLocalDpi xmlns:a14="http://schemas.microsoft.com/office/drawing/2010/main" val="0"/>
+              </a:ext>
+            </a:extLst>
+          </a:blip>
+          <a:stretch>
+            <a:fillRect/>
+          </a:stretch>
+        </p:blipFill>
+        <p:spPr>
+          <a:xfrm>
+            <a:off x="1675063" y="3194906"/>
+            <a:ext cx="2825206" cy="2213690"/>
+          </a:xfrm>
+          <a:prstGeom prst="rect">
+            <a:avLst/>
+          </a:prstGeom>
+        </p:spPr>
+      </p:pic>
+      <p:pic>
+        <p:nvPicPr>
+          <p:cNvPr id="6" name="Picture 5"/>
+          <p:cNvPicPr>
+            <a:picLocks noChangeAspect="1"/>
+          </p:cNvPicPr>
+          <p:nvPr/>
+        </p:nvPicPr>
+        <p:blipFill>
+          <a:blip r:embed="rId4">
+            <a:extLst>
+              <a:ext uri="{28A0092B-C50C-407E-A947-70E740481C1C}">
+                <a14:useLocalDpi xmlns:a14="http://schemas.microsoft.com/office/drawing/2010/main" val="0"/>
+              </a:ext>
+            </a:extLst>
+          </a:blip>
+          <a:stretch>
+            <a:fillRect/>
+          </a:stretch>
+        </p:blipFill>
+        <p:spPr>
+          <a:xfrm>
+            <a:off x="5378333" y="4033875"/>
+            <a:ext cx="1779139" cy="876293"/>
+          </a:xfrm>
+          <a:prstGeom prst="rect">
+            <a:avLst/>
+          </a:prstGeom>
+        </p:spPr>
+      </p:pic>
+      <p:cxnSp>
+        <p:nvCxnSpPr>
+          <p:cNvPr id="8" name="Straight Arrow Connector 7"/>
+          <p:cNvCxnSpPr/>
+          <p:nvPr/>
+        </p:nvCxnSpPr>
+        <p:spPr>
+          <a:xfrm>
+            <a:off x="4741523" y="4454237"/>
+            <a:ext cx="395556" cy="0"/>
+          </a:xfrm>
+          <a:prstGeom prst="straightConnector1">
+            <a:avLst/>
+          </a:prstGeom>
+          <a:ln>
+            <a:tailEnd type="triangle"/>
+          </a:ln>
+        </p:spPr>
+        <p:style>
+          <a:lnRef idx="3">
+            <a:schemeClr val="dk1"/>
+          </a:lnRef>
+          <a:fillRef idx="0">
+            <a:schemeClr val="dk1"/>
+          </a:fillRef>
+          <a:effectRef idx="2">
+            <a:schemeClr val="dk1"/>
+          </a:effectRef>
+          <a:fontRef idx="minor">
+            <a:schemeClr val="tx1"/>
+          </a:fontRef>
+        </p:style>
+      </p:cxnSp>
+    </p:spTree>
+    <p:extLst>
+      <p:ext uri="{BB962C8B-B14F-4D97-AF65-F5344CB8AC3E}">
+        <p14:creationId xmlns:p14="http://schemas.microsoft.com/office/powerpoint/2010/main" val="2193163558"/>
+      </p:ext>
+    </p:extLst>
   </p:cSld>
   <p:clrMapOvr>
     <a:masterClrMapping/>
@@ -3410,6 +5378,8 @@
       </a:bgFillStyleLst>
     </a:fmtScheme>
   </a:themeElements>
+  <a:objectDefaults/>
+  <a:extraClrSchemeLst/>
   <a:extLst>
     <a:ext uri="{05A4C25C-085E-4340-85A3-A5531E510DB2}">
       <thm15:themeFamily xmlns:thm15="http://schemas.microsoft.com/office/thememl/2012/main" name="Office Theme" id="{62F939B6-93AF-4DB8-9C6B-D6C7DFDC589F}" vid="{4A3C46E8-61CC-4603-A589-7422A47A8E4A}"/>
@@ -3669,6 +5639,8 @@
       </a:bgFillStyleLst>
     </a:fmtScheme>
   </a:themeElements>
+  <a:objectDefaults/>
+  <a:extraClrSchemeLst/>
   <a:extLst>
     <a:ext uri="{05A4C25C-085E-4340-85A3-A5531E510DB2}">
       <thm15:themeFamily xmlns:thm15="http://schemas.microsoft.com/office/thememl/2012/main" name="Office Theme" id="{62F939B6-93AF-4DB8-9C6B-D6C7DFDC589F}" vid="{4A3C46E8-61CC-4603-A589-7422A47A8E4A}"/>

</xml_diff>

<commit_message>
[Presentation] Second Draft for Presentation
Signed-off-by: Chances-1 <brandonteohph@gmail.com>
</commit_message>
<xml_diff>
--- a/Java_Class_23rd_Nov.pptx
+++ b/Java_Class_23rd_Nov.pptx
@@ -5,7 +5,7 @@
     <p:sldMasterId id="2147483648" r:id="rId1"/>
   </p:sldMasterIdLst>
   <p:notesMasterIdLst>
-    <p:notesMasterId r:id="rId13"/>
+    <p:notesMasterId r:id="rId14"/>
   </p:notesMasterIdLst>
   <p:sldIdLst>
     <p:sldId id="256" r:id="rId2"/>
@@ -19,6 +19,7 @@
     <p:sldId id="261" r:id="rId10"/>
     <p:sldId id="270" r:id="rId11"/>
     <p:sldId id="271" r:id="rId12"/>
+    <p:sldId id="273" r:id="rId13"/>
   </p:sldIdLst>
   <p:sldSz cx="9144000" cy="6858000" type="screen4x3"/>
   <p:notesSz cx="7104063" cy="10234613"/>
@@ -210,7 +211,7 @@
           <a:p>
             <a:fld id="{3EFD42F7-718C-4B98-AAEC-167E6DDD60A7}" type="datetimeFigureOut">
               <a:rPr lang="en-US" smtClean="0"/>
-              <a:t>11/21/2016</a:t>
+              <a:t>11/22/2016</a:t>
             </a:fld>
             <a:endParaRPr lang="en-US"/>
           </a:p>
@@ -742,7 +743,7 @@
           <a:p>
             <a:fld id="{FDE934FF-F4E1-47C5-9CA5-30A81DDE2BE4}" type="datetimeFigureOut">
               <a:rPr lang="en-US" smtClean="0"/>
-              <a:t>11/21/2016</a:t>
+              <a:t>11/22/2016</a:t>
             </a:fld>
             <a:endParaRPr lang="en-US"/>
           </a:p>
@@ -889,7 +890,7 @@
           <a:p>
             <a:fld id="{FDE934FF-F4E1-47C5-9CA5-30A81DDE2BE4}" type="datetimeFigureOut">
               <a:rPr lang="en-US" smtClean="0"/>
-              <a:t>11/21/2016</a:t>
+              <a:t>11/22/2016</a:t>
             </a:fld>
             <a:endParaRPr lang="en-US"/>
           </a:p>
@@ -1054,7 +1055,7 @@
           <a:p>
             <a:fld id="{FDE934FF-F4E1-47C5-9CA5-30A81DDE2BE4}" type="datetimeFigureOut">
               <a:rPr lang="en-US" smtClean="0"/>
-              <a:t>11/21/2016</a:t>
+              <a:t>11/22/2016</a:t>
             </a:fld>
             <a:endParaRPr lang="en-US"/>
           </a:p>
@@ -1295,7 +1296,7 @@
           <a:p>
             <a:fld id="{FDE934FF-F4E1-47C5-9CA5-30A81DDE2BE4}" type="datetimeFigureOut">
               <a:rPr lang="en-US" smtClean="0"/>
-              <a:t>11/21/2016</a:t>
+              <a:t>11/22/2016</a:t>
             </a:fld>
             <a:endParaRPr lang="en-US"/>
           </a:p>
@@ -1522,7 +1523,7 @@
           <a:p>
             <a:fld id="{FDE934FF-F4E1-47C5-9CA5-30A81DDE2BE4}" type="datetimeFigureOut">
               <a:rPr lang="en-US" smtClean="0"/>
-              <a:t>11/21/2016</a:t>
+              <a:t>11/22/2016</a:t>
             </a:fld>
             <a:endParaRPr lang="en-US"/>
           </a:p>
@@ -1884,7 +1885,7 @@
           <a:p>
             <a:fld id="{FDE934FF-F4E1-47C5-9CA5-30A81DDE2BE4}" type="datetimeFigureOut">
               <a:rPr lang="en-US" smtClean="0"/>
-              <a:t>11/21/2016</a:t>
+              <a:t>11/22/2016</a:t>
             </a:fld>
             <a:endParaRPr lang="en-US"/>
           </a:p>
@@ -1997,7 +1998,7 @@
           <a:p>
             <a:fld id="{FDE934FF-F4E1-47C5-9CA5-30A81DDE2BE4}" type="datetimeFigureOut">
               <a:rPr lang="en-US" smtClean="0"/>
-              <a:t>11/21/2016</a:t>
+              <a:t>11/22/2016</a:t>
             </a:fld>
             <a:endParaRPr lang="en-US"/>
           </a:p>
@@ -2087,7 +2088,7 @@
           <a:p>
             <a:fld id="{FDE934FF-F4E1-47C5-9CA5-30A81DDE2BE4}" type="datetimeFigureOut">
               <a:rPr lang="en-US" smtClean="0"/>
-              <a:t>11/21/2016</a:t>
+              <a:t>11/22/2016</a:t>
             </a:fld>
             <a:endParaRPr lang="en-US"/>
           </a:p>
@@ -2335,7 +2336,7 @@
           <a:p>
             <a:fld id="{FDE934FF-F4E1-47C5-9CA5-30A81DDE2BE4}" type="datetimeFigureOut">
               <a:rPr lang="en-US" smtClean="0"/>
-              <a:t>11/21/2016</a:t>
+              <a:t>11/22/2016</a:t>
             </a:fld>
             <a:endParaRPr lang="en-US"/>
           </a:p>
@@ -2517,7 +2518,7 @@
           <a:p>
             <a:fld id="{FDE934FF-F4E1-47C5-9CA5-30A81DDE2BE4}" type="datetimeFigureOut">
               <a:rPr lang="en-US" smtClean="0"/>
-              <a:t>11/21/2016</a:t>
+              <a:t>11/22/2016</a:t>
             </a:fld>
             <a:endParaRPr lang="en-US"/>
           </a:p>
@@ -2725,7 +2726,7 @@
           <a:p>
             <a:fld id="{FDE934FF-F4E1-47C5-9CA5-30A81DDE2BE4}" type="datetimeFigureOut">
               <a:rPr lang="en-US" smtClean="0"/>
-              <a:t>11/21/2016</a:t>
+              <a:t>11/22/2016</a:t>
             </a:fld>
             <a:endParaRPr lang="en-US"/>
           </a:p>
@@ -3707,6 +3708,272 @@
 </p:sld>
 </file>
 
+<file path=ppt/slides/slide12.xml><?xml version="1.0" encoding="utf-8"?>
+<p:sld xmlns:a="http://schemas.openxmlformats.org/drawingml/2006/main" xmlns:r="http://schemas.openxmlformats.org/officeDocument/2006/relationships" xmlns:p="http://schemas.openxmlformats.org/presentationml/2006/main">
+  <p:cSld>
+    <p:spTree>
+      <p:nvGrpSpPr>
+        <p:cNvPr id="1" name=""/>
+        <p:cNvGrpSpPr/>
+        <p:nvPr/>
+      </p:nvGrpSpPr>
+      <p:grpSpPr>
+        <a:xfrm>
+          <a:off x="0" y="0"/>
+          <a:ext cx="0" cy="0"/>
+          <a:chOff x="0" y="0"/>
+          <a:chExt cx="0" cy="0"/>
+        </a:xfrm>
+      </p:grpSpPr>
+      <p:sp>
+        <p:nvSpPr>
+          <p:cNvPr id="4" name="TextBox 3"/>
+          <p:cNvSpPr txBox="1"/>
+          <p:nvPr/>
+        </p:nvSpPr>
+        <p:spPr>
+          <a:xfrm>
+            <a:off x="739739" y="503434"/>
+            <a:ext cx="6142194" cy="830997"/>
+          </a:xfrm>
+          <a:prstGeom prst="rect">
+            <a:avLst/>
+          </a:prstGeom>
+          <a:noFill/>
+        </p:spPr>
+        <p:txBody>
+          <a:bodyPr wrap="none" rtlCol="0">
+            <a:spAutoFit/>
+          </a:bodyPr>
+          <a:lstStyle/>
+          <a:p>
+            <a:r>
+              <a:rPr lang="en-US" sz="4800" dirty="0" smtClean="0"/>
+              <a:t>But wait, I have more…</a:t>
+            </a:r>
+            <a:endParaRPr lang="en-US" sz="4800" dirty="0"/>
+          </a:p>
+        </p:txBody>
+      </p:sp>
+      <p:sp>
+        <p:nvSpPr>
+          <p:cNvPr id="5" name="TextBox 4"/>
+          <p:cNvSpPr txBox="1"/>
+          <p:nvPr/>
+        </p:nvSpPr>
+        <p:spPr>
+          <a:xfrm>
+            <a:off x="1149525" y="1793020"/>
+            <a:ext cx="6965878" cy="1077218"/>
+          </a:xfrm>
+          <a:prstGeom prst="rect">
+            <a:avLst/>
+          </a:prstGeom>
+          <a:noFill/>
+        </p:spPr>
+        <p:txBody>
+          <a:bodyPr wrap="square" rtlCol="0">
+            <a:spAutoFit/>
+          </a:bodyPr>
+          <a:lstStyle/>
+          <a:p>
+            <a:pPr fontAlgn="base"/>
+            <a:r>
+              <a:rPr lang="en-US" sz="3200" dirty="0" smtClean="0"/>
+              <a:t>Perhaps you’ve heard of GitHub? Open Source?</a:t>
+            </a:r>
+          </a:p>
+        </p:txBody>
+      </p:sp>
+      <p:sp>
+        <p:nvSpPr>
+          <p:cNvPr id="7" name="Rectangle 6"/>
+          <p:cNvSpPr/>
+          <p:nvPr/>
+        </p:nvSpPr>
+        <p:spPr>
+          <a:xfrm>
+            <a:off x="4448709" y="3605826"/>
+            <a:ext cx="3797322" cy="369332"/>
+          </a:xfrm>
+          <a:prstGeom prst="rect">
+            <a:avLst/>
+          </a:prstGeom>
+        </p:spPr>
+        <p:txBody>
+          <a:bodyPr wrap="none">
+            <a:spAutoFit/>
+          </a:bodyPr>
+          <a:lstStyle/>
+          <a:p>
+            <a:r>
+              <a:rPr lang="en-MY" i="1" u="sng" dirty="0">
+                <a:solidFill>
+                  <a:srgbClr val="0070C0"/>
+                </a:solidFill>
+              </a:rPr>
+              <a:t>https://github.com/Chances-1/Swerve</a:t>
+            </a:r>
+          </a:p>
+        </p:txBody>
+      </p:sp>
+      <p:sp>
+        <p:nvSpPr>
+          <p:cNvPr id="8" name="TextBox 7"/>
+          <p:cNvSpPr txBox="1"/>
+          <p:nvPr/>
+        </p:nvSpPr>
+        <p:spPr>
+          <a:xfrm>
+            <a:off x="739739" y="3328827"/>
+            <a:ext cx="3359295" cy="923330"/>
+          </a:xfrm>
+          <a:prstGeom prst="rect">
+            <a:avLst/>
+          </a:prstGeom>
+          <a:noFill/>
+        </p:spPr>
+        <p:txBody>
+          <a:bodyPr wrap="square" rtlCol="0">
+            <a:spAutoFit/>
+          </a:bodyPr>
+          <a:lstStyle/>
+          <a:p>
+            <a:r>
+              <a:rPr lang="en-US" dirty="0" smtClean="0"/>
+              <a:t>This is a small game in Java. A tiny project I am currently working on. Feel free to edit it to your liking!</a:t>
+            </a:r>
+            <a:endParaRPr lang="en-MY" dirty="0"/>
+          </a:p>
+        </p:txBody>
+      </p:sp>
+      <p:sp>
+        <p:nvSpPr>
+          <p:cNvPr id="10" name="TextBox 9"/>
+          <p:cNvSpPr txBox="1"/>
+          <p:nvPr/>
+        </p:nvSpPr>
+        <p:spPr>
+          <a:xfrm>
+            <a:off x="1149525" y="4379491"/>
+            <a:ext cx="7101816" cy="1631216"/>
+          </a:xfrm>
+          <a:prstGeom prst="rect">
+            <a:avLst/>
+          </a:prstGeom>
+          <a:noFill/>
+        </p:spPr>
+        <p:txBody>
+          <a:bodyPr wrap="none" rtlCol="0">
+            <a:spAutoFit/>
+          </a:bodyPr>
+          <a:lstStyle/>
+          <a:p>
+            <a:r>
+              <a:rPr lang="en-US" sz="2000" dirty="0" smtClean="0"/>
+              <a:t>Steps</a:t>
+            </a:r>
+          </a:p>
+          <a:p>
+            <a:pPr marL="285750" indent="-285750">
+              <a:buFontTx/>
+              <a:buChar char="-"/>
+            </a:pPr>
+            <a:r>
+              <a:rPr lang="en-US" sz="2000" dirty="0" smtClean="0"/>
+              <a:t>Fork this repository to your GitHub account.</a:t>
+            </a:r>
+          </a:p>
+          <a:p>
+            <a:pPr marL="285750" indent="-285750">
+              <a:buFontTx/>
+              <a:buChar char="-"/>
+            </a:pPr>
+            <a:r>
+              <a:rPr lang="en-US" sz="2000" dirty="0" smtClean="0"/>
+              <a:t>Link the repo to your computer. Learn a bit of </a:t>
+            </a:r>
+            <a:r>
+              <a:rPr lang="en-US" sz="2000" dirty="0" err="1" smtClean="0"/>
+              <a:t>Git</a:t>
+            </a:r>
+            <a:r>
+              <a:rPr lang="en-US" sz="2000" dirty="0" smtClean="0"/>
+              <a:t> too.</a:t>
+            </a:r>
+          </a:p>
+          <a:p>
+            <a:pPr marL="285750" indent="-285750">
+              <a:buFontTx/>
+              <a:buChar char="-"/>
+            </a:pPr>
+            <a:r>
+              <a:rPr lang="en-US" sz="2000" dirty="0" smtClean="0"/>
+              <a:t>Edit it- smoosh it, mangle it, add many, MANY different things!</a:t>
+            </a:r>
+          </a:p>
+          <a:p>
+            <a:pPr marL="285750" indent="-285750">
+              <a:buFontTx/>
+              <a:buChar char="-"/>
+            </a:pPr>
+            <a:r>
+              <a:rPr lang="en-US" sz="2000" dirty="0" smtClean="0"/>
+              <a:t>Send me a pull request when you’re ready to share! </a:t>
+            </a:r>
+            <a:endParaRPr lang="en-MY" sz="2000" dirty="0"/>
+          </a:p>
+        </p:txBody>
+      </p:sp>
+      <p:sp>
+        <p:nvSpPr>
+          <p:cNvPr id="11" name="TextBox 10"/>
+          <p:cNvSpPr txBox="1"/>
+          <p:nvPr/>
+        </p:nvSpPr>
+        <p:spPr>
+          <a:xfrm>
+            <a:off x="2317581" y="6138041"/>
+            <a:ext cx="4262257" cy="369332"/>
+          </a:xfrm>
+          <a:prstGeom prst="rect">
+            <a:avLst/>
+          </a:prstGeom>
+          <a:noFill/>
+        </p:spPr>
+        <p:txBody>
+          <a:bodyPr wrap="none" rtlCol="0">
+            <a:spAutoFit/>
+          </a:bodyPr>
+          <a:lstStyle/>
+          <a:p>
+            <a:r>
+              <a:rPr lang="en-US" dirty="0" smtClean="0"/>
+              <a:t>We’ll have a look at your code next week </a:t>
+            </a:r>
+            <a:r>
+              <a:rPr lang="en-US" dirty="0" smtClean="0">
+                <a:sym typeface="Wingdings" panose="05000000000000000000" pitchFamily="2" charset="2"/>
+              </a:rPr>
+              <a:t></a:t>
+            </a:r>
+            <a:endParaRPr lang="en-MY" dirty="0"/>
+          </a:p>
+        </p:txBody>
+      </p:sp>
+    </p:spTree>
+    <p:extLst>
+      <p:ext uri="{BB962C8B-B14F-4D97-AF65-F5344CB8AC3E}">
+        <p14:creationId xmlns:p14="http://schemas.microsoft.com/office/powerpoint/2010/main" val="4289618107"/>
+      </p:ext>
+    </p:extLst>
+  </p:cSld>
+  <p:clrMapOvr>
+    <a:masterClrMapping/>
+  </p:clrMapOvr>
+</p:sld>
+</file>
+
 <file path=ppt/slides/slide2.xml><?xml version="1.0" encoding="utf-8"?>
 <p:sld xmlns:a="http://schemas.openxmlformats.org/drawingml/2006/main" xmlns:r="http://schemas.openxmlformats.org/officeDocument/2006/relationships" xmlns:p="http://schemas.openxmlformats.org/presentationml/2006/main">
   <p:cSld>
@@ -4128,7 +4395,7 @@
       </p:sp>
       <p:pic>
         <p:nvPicPr>
-          <p:cNvPr id="5" name="Picture 4"/>
+          <p:cNvPr id="2" name="Picture 1"/>
           <p:cNvPicPr>
             <a:picLocks noChangeAspect="1"/>
           </p:cNvPicPr>
@@ -4148,8 +4415,8 @@
         </p:blipFill>
         <p:spPr>
           <a:xfrm>
-            <a:off x="1687809" y="1660727"/>
-            <a:ext cx="5055622" cy="4082527"/>
+            <a:off x="2077758" y="1246365"/>
+            <a:ext cx="4549074" cy="5201856"/>
           </a:xfrm>
           <a:prstGeom prst="rect">
             <a:avLst/>
@@ -4186,69 +4453,9 @@
           <a:chExt cx="0" cy="0"/>
         </a:xfrm>
       </p:grpSpPr>
-      <p:sp>
-        <p:nvSpPr>
-          <p:cNvPr id="2" name="Text Box 3"/>
-          <p:cNvSpPr txBox="1"/>
-          <p:nvPr/>
-        </p:nvSpPr>
-        <p:spPr>
-          <a:xfrm>
-            <a:off x="482885" y="400557"/>
-            <a:ext cx="2753474" cy="769441"/>
-          </a:xfrm>
-          <a:prstGeom prst="rect">
-            <a:avLst/>
-          </a:prstGeom>
-          <a:noFill/>
-        </p:spPr>
-        <p:txBody>
-          <a:bodyPr wrap="square" rtlCol="0">
-            <a:spAutoFit/>
-          </a:bodyPr>
-          <a:lstStyle/>
-          <a:p>
-            <a:pPr algn="ctr"/>
-            <a:r>
-              <a:rPr lang="en-US" altLang="en-US" sz="4400" dirty="0" smtClean="0"/>
-              <a:t>Privacy</a:t>
-            </a:r>
-          </a:p>
-        </p:txBody>
-      </p:sp>
-      <p:sp>
-        <p:nvSpPr>
-          <p:cNvPr id="4" name="TextBox 3"/>
-          <p:cNvSpPr txBox="1"/>
-          <p:nvPr/>
-        </p:nvSpPr>
-        <p:spPr>
-          <a:xfrm>
-            <a:off x="1458931" y="1479479"/>
-            <a:ext cx="6596008" cy="830997"/>
-          </a:xfrm>
-          <a:prstGeom prst="rect">
-            <a:avLst/>
-          </a:prstGeom>
-          <a:noFill/>
-        </p:spPr>
-        <p:txBody>
-          <a:bodyPr wrap="square" rtlCol="0">
-            <a:spAutoFit/>
-          </a:bodyPr>
-          <a:lstStyle/>
-          <a:p>
-            <a:r>
-              <a:rPr lang="en-US" sz="2400" dirty="0" smtClean="0"/>
-              <a:t>Privacy is a big part of OOP – it allows or disallows easy editing or sight of certain variables…</a:t>
-            </a:r>
-            <a:endParaRPr lang="en-MY" sz="2400" dirty="0"/>
-          </a:p>
-        </p:txBody>
-      </p:sp>
       <p:pic>
         <p:nvPicPr>
-          <p:cNvPr id="5" name="Picture 4"/>
+          <p:cNvPr id="10" name="Picture 9"/>
           <p:cNvPicPr>
             <a:picLocks noChangeAspect="1"/>
           </p:cNvPicPr>
@@ -4268,14 +4475,74 @@
         </p:blipFill>
         <p:spPr>
           <a:xfrm>
-            <a:off x="3211255" y="2619956"/>
-            <a:ext cx="4453266" cy="3596111"/>
+            <a:off x="4029075" y="841825"/>
+            <a:ext cx="4549074" cy="5201856"/>
           </a:xfrm>
           <a:prstGeom prst="rect">
             <a:avLst/>
           </a:prstGeom>
         </p:spPr>
       </p:pic>
+      <p:sp>
+        <p:nvSpPr>
+          <p:cNvPr id="2" name="Text Box 3"/>
+          <p:cNvSpPr txBox="1"/>
+          <p:nvPr/>
+        </p:nvSpPr>
+        <p:spPr>
+          <a:xfrm>
+            <a:off x="482885" y="400557"/>
+            <a:ext cx="2753474" cy="769441"/>
+          </a:xfrm>
+          <a:prstGeom prst="rect">
+            <a:avLst/>
+          </a:prstGeom>
+          <a:noFill/>
+        </p:spPr>
+        <p:txBody>
+          <a:bodyPr wrap="square" rtlCol="0">
+            <a:spAutoFit/>
+          </a:bodyPr>
+          <a:lstStyle/>
+          <a:p>
+            <a:pPr algn="ctr"/>
+            <a:r>
+              <a:rPr lang="en-US" altLang="en-US" sz="4400" dirty="0" smtClean="0"/>
+              <a:t>Privacy</a:t>
+            </a:r>
+          </a:p>
+        </p:txBody>
+      </p:sp>
+      <p:sp>
+        <p:nvSpPr>
+          <p:cNvPr id="4" name="TextBox 3"/>
+          <p:cNvSpPr txBox="1"/>
+          <p:nvPr/>
+        </p:nvSpPr>
+        <p:spPr>
+          <a:xfrm>
+            <a:off x="1495318" y="1288966"/>
+            <a:ext cx="2250040" cy="2677656"/>
+          </a:xfrm>
+          <a:prstGeom prst="rect">
+            <a:avLst/>
+          </a:prstGeom>
+          <a:noFill/>
+        </p:spPr>
+        <p:txBody>
+          <a:bodyPr wrap="square" rtlCol="0">
+            <a:spAutoFit/>
+          </a:bodyPr>
+          <a:lstStyle/>
+          <a:p>
+            <a:r>
+              <a:rPr lang="en-US" sz="2400" dirty="0" smtClean="0"/>
+              <a:t>Privacy is a big part of OOP – it allows or disallows easy editing or sight of certain variables…</a:t>
+            </a:r>
+            <a:endParaRPr lang="en-MY" sz="2400" dirty="0"/>
+          </a:p>
+        </p:txBody>
+      </p:sp>
       <p:sp>
         <p:nvSpPr>
           <p:cNvPr id="6" name="TextBox 5"/>
@@ -4284,7 +4551,7 @@
         </p:nvSpPr>
         <p:spPr>
           <a:xfrm>
-            <a:off x="1299681" y="2979506"/>
+            <a:off x="1695599" y="4284324"/>
             <a:ext cx="1119882" cy="1631216"/>
           </a:xfrm>
           <a:prstGeom prst="rect">
@@ -4314,7 +4581,7 @@
         </p:nvSpPr>
         <p:spPr>
           <a:xfrm>
-            <a:off x="3476625" y="2885179"/>
+            <a:off x="4261421" y="1288966"/>
             <a:ext cx="514350" cy="188654"/>
           </a:xfrm>
           <a:prstGeom prst="rect">
@@ -4360,7 +4627,7 @@
         </p:nvSpPr>
         <p:spPr>
           <a:xfrm>
-            <a:off x="3476625" y="3442753"/>
+            <a:off x="4297808" y="2055741"/>
             <a:ext cx="552450" cy="226031"/>
           </a:xfrm>
           <a:prstGeom prst="rect">
@@ -4406,7 +4673,7 @@
         </p:nvSpPr>
         <p:spPr>
           <a:xfrm>
-            <a:off x="3476625" y="4829410"/>
+            <a:off x="4297808" y="3726221"/>
             <a:ext cx="716756" cy="152165"/>
           </a:xfrm>
           <a:prstGeom prst="rect">

</xml_diff>